<commit_message>
Poster and Oral presentation final drafts.
</commit_message>
<xml_diff>
--- a/Oral presentation/Grating Lobes.pptx
+++ b/Oral presentation/Grating Lobes.pptx
@@ -4094,7 +4094,7 @@
           <a:p>
             <a:r>
               <a:rPr lang="en-ZA" dirty="0"/>
-              <a:t>Fourier Transform and the AF</a:t>
+              <a:t>Fourier Transform and the AF:</a:t>
             </a:r>
           </a:p>
         </p:txBody>
@@ -4122,7 +4122,7 @@
         </p:blipFill>
         <p:spPr>
           <a:xfrm>
-            <a:off x="2494626" y="1533569"/>
+            <a:off x="2494626" y="1622345"/>
             <a:ext cx="7381182" cy="4959306"/>
           </a:xfrm>
         </p:spPr>
@@ -4377,6 +4377,796 @@
           </a:p>
         </p:txBody>
       </p:sp>
+      <mc:AlternateContent xmlns:mc="http://schemas.openxmlformats.org/markup-compatibility/2006" xmlns:a14="http://schemas.microsoft.com/office/drawing/2010/main">
+        <mc:Choice Requires="a14">
+          <p:sp>
+            <p:nvSpPr>
+              <p:cNvPr id="10" name="TextBox 9">
+                <a:extLst>
+                  <a:ext uri="{FF2B5EF4-FFF2-40B4-BE49-F238E27FC236}">
+                    <a16:creationId xmlns:a16="http://schemas.microsoft.com/office/drawing/2014/main" id="{6179E046-5744-4700-A805-615F987FA692}"/>
+                  </a:ext>
+                </a:extLst>
+              </p:cNvPr>
+              <p:cNvSpPr txBox="1"/>
+              <p:nvPr/>
+            </p:nvSpPr>
+            <p:spPr>
+              <a:xfrm>
+                <a:off x="7131941" y="476289"/>
+                <a:ext cx="5487733" cy="1038811"/>
+              </a:xfrm>
+              <a:prstGeom prst="rect">
+                <a:avLst/>
+              </a:prstGeom>
+              <a:noFill/>
+            </p:spPr>
+            <p:txBody>
+              <a:bodyPr wrap="square" lIns="0" tIns="0" rIns="0" bIns="0" rtlCol="0">
+                <a:spAutoFit/>
+              </a:bodyPr>
+              <a:lstStyle/>
+              <a:p>
+                <a:pPr/>
+                <a14:m>
+                  <m:oMathPara xmlns:m="http://schemas.openxmlformats.org/officeDocument/2006/math">
+                    <m:oMathParaPr>
+                      <m:jc m:val="centerGroup"/>
+                    </m:oMathParaPr>
+                    <m:oMath xmlns:m="http://schemas.openxmlformats.org/officeDocument/2006/math">
+                      <m:r>
+                        <a:rPr lang="en-ZA" sz="2400" b="0" i="1" smtClean="0">
+                          <a:latin typeface="Cambria Math" panose="02040503050406030204" pitchFamily="18" charset="0"/>
+                        </a:rPr>
+                        <m:t>𝐷𝐹𝑇</m:t>
+                      </m:r>
+                      <m:r>
+                        <a:rPr lang="en-ZA" sz="2400" b="0" i="1" smtClean="0">
+                          <a:latin typeface="Cambria Math" panose="02040503050406030204" pitchFamily="18" charset="0"/>
+                        </a:rPr>
+                        <m:t>=</m:t>
+                      </m:r>
+                      <m:nary>
+                        <m:naryPr>
+                          <m:chr m:val="∑"/>
+                          <m:ctrlPr>
+                            <a:rPr lang="en-ZA" sz="2400" i="1">
+                              <a:latin typeface="Cambria Math" panose="02040503050406030204" pitchFamily="18" charset="0"/>
+                            </a:rPr>
+                          </m:ctrlPr>
+                        </m:naryPr>
+                        <m:sub>
+                          <m:r>
+                            <a:rPr lang="en-ZA" sz="2400" b="0" i="1" smtClean="0">
+                              <a:latin typeface="Cambria Math" panose="02040503050406030204" pitchFamily="18" charset="0"/>
+                            </a:rPr>
+                            <m:t>𝑛</m:t>
+                          </m:r>
+                          <m:r>
+                            <a:rPr lang="en-ZA" sz="2400" i="1">
+                              <a:latin typeface="Cambria Math" panose="02040503050406030204" pitchFamily="18" charset="0"/>
+                            </a:rPr>
+                            <m:t>=0</m:t>
+                          </m:r>
+                        </m:sub>
+                        <m:sup>
+                          <m:r>
+                            <a:rPr lang="en-ZA" sz="2400" i="1">
+                              <a:latin typeface="Cambria Math" panose="02040503050406030204" pitchFamily="18" charset="0"/>
+                            </a:rPr>
+                            <m:t>𝑁</m:t>
+                          </m:r>
+                          <m:r>
+                            <a:rPr lang="en-ZA" sz="2400" i="1">
+                              <a:latin typeface="Cambria Math" panose="02040503050406030204" pitchFamily="18" charset="0"/>
+                            </a:rPr>
+                            <m:t>−1</m:t>
+                          </m:r>
+                        </m:sup>
+                        <m:e>
+                          <m:r>
+                            <a:rPr lang="en-ZA" sz="2400" b="0" i="1" smtClean="0">
+                              <a:latin typeface="Cambria Math" panose="02040503050406030204" pitchFamily="18" charset="0"/>
+                            </a:rPr>
+                            <m:t>𝑥</m:t>
+                          </m:r>
+                          <m:r>
+                            <a:rPr lang="en-ZA" sz="2400" b="0" i="1" smtClean="0">
+                              <a:latin typeface="Cambria Math" panose="02040503050406030204" pitchFamily="18" charset="0"/>
+                            </a:rPr>
+                            <m:t>(</m:t>
+                          </m:r>
+                          <m:r>
+                            <a:rPr lang="en-ZA" sz="2400" b="0" i="1" smtClean="0">
+                              <a:latin typeface="Cambria Math" panose="02040503050406030204" pitchFamily="18" charset="0"/>
+                            </a:rPr>
+                            <m:t>𝑛</m:t>
+                          </m:r>
+                          <m:r>
+                            <a:rPr lang="en-ZA" sz="2400" b="0" i="1" smtClean="0">
+                              <a:latin typeface="Cambria Math" panose="02040503050406030204" pitchFamily="18" charset="0"/>
+                            </a:rPr>
+                            <m:t>)</m:t>
+                          </m:r>
+                          <m:sSup>
+                            <m:sSupPr>
+                              <m:ctrlPr>
+                                <a:rPr lang="en-ZA" sz="2400" i="1">
+                                  <a:latin typeface="Cambria Math" panose="02040503050406030204" pitchFamily="18" charset="0"/>
+                                </a:rPr>
+                              </m:ctrlPr>
+                            </m:sSupPr>
+                            <m:e>
+                              <m:r>
+                                <a:rPr lang="en-ZA" sz="2400" i="1">
+                                  <a:latin typeface="Cambria Math" panose="02040503050406030204" pitchFamily="18" charset="0"/>
+                                </a:rPr>
+                                <m:t>𝑒</m:t>
+                              </m:r>
+                            </m:e>
+                            <m:sup>
+                              <m:r>
+                                <a:rPr lang="en-ZA" sz="2400" b="0" i="1" smtClean="0">
+                                  <a:latin typeface="Cambria Math" panose="02040503050406030204" pitchFamily="18" charset="0"/>
+                                </a:rPr>
+                                <m:t>−</m:t>
+                              </m:r>
+                              <m:r>
+                                <a:rPr lang="en-ZA" sz="2400" i="1">
+                                  <a:latin typeface="Cambria Math" panose="02040503050406030204" pitchFamily="18" charset="0"/>
+                                </a:rPr>
+                                <m:t>𝑗</m:t>
+                              </m:r>
+                              <m:r>
+                                <a:rPr lang="en-ZA" sz="2400" i="1">
+                                  <a:latin typeface="Cambria Math" panose="02040503050406030204" pitchFamily="18" charset="0"/>
+                                </a:rPr>
+                                <m:t>(</m:t>
+                              </m:r>
+                              <m:f>
+                                <m:fPr>
+                                  <m:ctrlPr>
+                                    <a:rPr lang="en-ZA" sz="2400" b="0" i="1" smtClean="0">
+                                      <a:latin typeface="Cambria Math" panose="02040503050406030204" pitchFamily="18" charset="0"/>
+                                    </a:rPr>
+                                  </m:ctrlPr>
+                                </m:fPr>
+                                <m:num>
+                                  <m:r>
+                                    <a:rPr lang="en-ZA" sz="2400" b="0" i="1" smtClean="0">
+                                      <a:latin typeface="Cambria Math" panose="02040503050406030204" pitchFamily="18" charset="0"/>
+                                    </a:rPr>
+                                    <m:t>2</m:t>
+                                  </m:r>
+                                  <m:r>
+                                    <a:rPr lang="en-ZA" sz="2400" b="0" i="1" smtClean="0">
+                                      <a:latin typeface="Cambria Math" panose="02040503050406030204" pitchFamily="18" charset="0"/>
+                                      <a:ea typeface="Cambria Math" panose="02040503050406030204" pitchFamily="18" charset="0"/>
+                                    </a:rPr>
+                                    <m:t>𝜋</m:t>
+                                  </m:r>
+                                  <m:r>
+                                    <a:rPr lang="en-ZA" sz="2400" b="0" i="1" smtClean="0">
+                                      <a:latin typeface="Cambria Math" panose="02040503050406030204" pitchFamily="18" charset="0"/>
+                                    </a:rPr>
+                                    <m:t>𝑘𝑛</m:t>
+                                  </m:r>
+                                </m:num>
+                                <m:den>
+                                  <m:r>
+                                    <a:rPr lang="en-ZA" sz="2400" b="0" i="1" smtClean="0">
+                                      <a:latin typeface="Cambria Math" panose="02040503050406030204" pitchFamily="18" charset="0"/>
+                                    </a:rPr>
+                                    <m:t>𝑁</m:t>
+                                  </m:r>
+                                </m:den>
+                              </m:f>
+                              <m:r>
+                                <a:rPr lang="en-ZA" sz="2400" b="0" i="1" smtClean="0">
+                                  <a:latin typeface="Cambria Math" panose="02040503050406030204" pitchFamily="18" charset="0"/>
+                                </a:rPr>
+                                <m:t>)</m:t>
+                              </m:r>
+                            </m:sup>
+                          </m:sSup>
+                        </m:e>
+                      </m:nary>
+                    </m:oMath>
+                  </m:oMathPara>
+                </a14:m>
+                <a:endParaRPr lang="en-ZA" sz="2400" dirty="0"/>
+              </a:p>
+            </p:txBody>
+          </p:sp>
+        </mc:Choice>
+        <mc:Fallback xmlns="">
+          <p:sp>
+            <p:nvSpPr>
+              <p:cNvPr id="10" name="TextBox 9">
+                <a:extLst>
+                  <a:ext uri="{FF2B5EF4-FFF2-40B4-BE49-F238E27FC236}">
+                    <a16:creationId xmlns:a16="http://schemas.microsoft.com/office/drawing/2014/main" id="{6179E046-5744-4700-A805-615F987FA692}"/>
+                  </a:ext>
+                </a:extLst>
+              </p:cNvPr>
+              <p:cNvSpPr txBox="1">
+                <a:spLocks noRot="1" noChangeAspect="1" noMove="1" noResize="1" noEditPoints="1" noAdjustHandles="1" noChangeArrowheads="1" noChangeShapeType="1" noTextEdit="1"/>
+              </p:cNvSpPr>
+              <p:nvPr/>
+            </p:nvSpPr>
+            <p:spPr>
+              <a:xfrm>
+                <a:off x="7131941" y="476289"/>
+                <a:ext cx="5487733" cy="1038811"/>
+              </a:xfrm>
+              <a:prstGeom prst="rect">
+                <a:avLst/>
+              </a:prstGeom>
+              <a:blipFill>
+                <a:blip r:embed="rId3"/>
+                <a:stretch>
+                  <a:fillRect/>
+                </a:stretch>
+              </a:blipFill>
+            </p:spPr>
+            <p:txBody>
+              <a:bodyPr/>
+              <a:lstStyle/>
+              <a:p>
+                <a:r>
+                  <a:rPr lang="en-ZA">
+                    <a:noFill/>
+                  </a:rPr>
+                  <a:t> </a:t>
+                </a:r>
+              </a:p>
+            </p:txBody>
+          </p:sp>
+        </mc:Fallback>
+      </mc:AlternateContent>
+      <p:cxnSp>
+        <p:nvCxnSpPr>
+          <p:cNvPr id="4" name="Straight Arrow Connector 3">
+            <a:extLst>
+              <a:ext uri="{FF2B5EF4-FFF2-40B4-BE49-F238E27FC236}">
+                <a16:creationId xmlns:a16="http://schemas.microsoft.com/office/drawing/2014/main" id="{19BC5383-6E45-4D9F-8515-427BCA27771F}"/>
+              </a:ext>
+            </a:extLst>
+          </p:cNvPr>
+          <p:cNvCxnSpPr>
+            <a:cxnSpLocks/>
+          </p:cNvCxnSpPr>
+          <p:nvPr/>
+        </p:nvCxnSpPr>
+        <p:spPr>
+          <a:xfrm flipV="1">
+            <a:off x="8065481" y="5001261"/>
+            <a:ext cx="550415" cy="1"/>
+          </a:xfrm>
+          <a:prstGeom prst="straightConnector1">
+            <a:avLst/>
+          </a:prstGeom>
+          <a:ln>
+            <a:headEnd type="triangle"/>
+            <a:tailEnd type="triangle"/>
+          </a:ln>
+        </p:spPr>
+        <p:style>
+          <a:lnRef idx="3">
+            <a:schemeClr val="accent2"/>
+          </a:lnRef>
+          <a:fillRef idx="0">
+            <a:schemeClr val="accent2"/>
+          </a:fillRef>
+          <a:effectRef idx="2">
+            <a:schemeClr val="accent2"/>
+          </a:effectRef>
+          <a:fontRef idx="minor">
+            <a:schemeClr val="tx1"/>
+          </a:fontRef>
+        </p:style>
+      </p:cxnSp>
+      <mc:AlternateContent xmlns:mc="http://schemas.openxmlformats.org/markup-compatibility/2006">
+        <mc:Choice xmlns:a14="http://schemas.microsoft.com/office/drawing/2010/main" Requires="a14">
+          <p:sp>
+            <p:nvSpPr>
+              <p:cNvPr id="17" name="TextBox 16">
+                <a:extLst>
+                  <a:ext uri="{FF2B5EF4-FFF2-40B4-BE49-F238E27FC236}">
+                    <a16:creationId xmlns:a16="http://schemas.microsoft.com/office/drawing/2014/main" id="{C43D502C-284E-4863-BCCC-4F7EE3549849}"/>
+                  </a:ext>
+                </a:extLst>
+              </p:cNvPr>
+              <p:cNvSpPr txBox="1"/>
+              <p:nvPr/>
+            </p:nvSpPr>
+            <p:spPr>
+              <a:xfrm>
+                <a:off x="8209580" y="4343697"/>
+                <a:ext cx="193258" cy="525978"/>
+              </a:xfrm>
+              <a:prstGeom prst="rect">
+                <a:avLst/>
+              </a:prstGeom>
+              <a:noFill/>
+            </p:spPr>
+            <p:txBody>
+              <a:bodyPr wrap="none" lIns="0" tIns="0" rIns="0" bIns="0" rtlCol="0">
+                <a:spAutoFit/>
+              </a:bodyPr>
+              <a:lstStyle/>
+              <a:p>
+                <a:pPr/>
+                <a14:m>
+                  <m:oMathPara xmlns:m="http://schemas.openxmlformats.org/officeDocument/2006/math">
+                    <m:oMathParaPr>
+                      <m:jc m:val="centerGroup"/>
+                    </m:oMathParaPr>
+                    <m:oMath xmlns:m="http://schemas.openxmlformats.org/officeDocument/2006/math">
+                      <m:f>
+                        <m:fPr>
+                          <m:ctrlPr>
+                            <a:rPr lang="en-ZA" i="1" smtClean="0">
+                              <a:latin typeface="Cambria Math" panose="02040503050406030204" pitchFamily="18" charset="0"/>
+                            </a:rPr>
+                          </m:ctrlPr>
+                        </m:fPr>
+                        <m:num>
+                          <m:r>
+                            <a:rPr lang="en-ZA" i="1" smtClean="0">
+                              <a:latin typeface="Cambria Math" panose="02040503050406030204" pitchFamily="18" charset="0"/>
+                              <a:ea typeface="Cambria Math" panose="02040503050406030204" pitchFamily="18" charset="0"/>
+                            </a:rPr>
+                            <m:t>𝜆</m:t>
+                          </m:r>
+                        </m:num>
+                        <m:den>
+                          <m:r>
+                            <a:rPr lang="en-ZA" b="0" i="1" smtClean="0">
+                              <a:latin typeface="Cambria Math" panose="02040503050406030204" pitchFamily="18" charset="0"/>
+                            </a:rPr>
+                            <m:t>𝑑</m:t>
+                          </m:r>
+                        </m:den>
+                      </m:f>
+                    </m:oMath>
+                  </m:oMathPara>
+                </a14:m>
+                <a:endParaRPr lang="en-ZA" dirty="0"/>
+              </a:p>
+            </p:txBody>
+          </p:sp>
+        </mc:Choice>
+        <mc:Fallback>
+          <p:sp>
+            <p:nvSpPr>
+              <p:cNvPr id="17" name="TextBox 16">
+                <a:extLst>
+                  <a:ext uri="{FF2B5EF4-FFF2-40B4-BE49-F238E27FC236}">
+                    <a16:creationId xmlns:a16="http://schemas.microsoft.com/office/drawing/2014/main" id="{C43D502C-284E-4863-BCCC-4F7EE3549849}"/>
+                  </a:ext>
+                </a:extLst>
+              </p:cNvPr>
+              <p:cNvSpPr txBox="1">
+                <a:spLocks noRot="1" noChangeAspect="1" noMove="1" noResize="1" noEditPoints="1" noAdjustHandles="1" noChangeArrowheads="1" noChangeShapeType="1" noTextEdit="1"/>
+              </p:cNvSpPr>
+              <p:nvPr/>
+            </p:nvSpPr>
+            <p:spPr>
+              <a:xfrm>
+                <a:off x="8209580" y="4343697"/>
+                <a:ext cx="193258" cy="525978"/>
+              </a:xfrm>
+              <a:prstGeom prst="rect">
+                <a:avLst/>
+              </a:prstGeom>
+              <a:blipFill>
+                <a:blip r:embed="rId4"/>
+                <a:stretch>
+                  <a:fillRect/>
+                </a:stretch>
+              </a:blipFill>
+            </p:spPr>
+            <p:txBody>
+              <a:bodyPr/>
+              <a:lstStyle/>
+              <a:p>
+                <a:r>
+                  <a:rPr lang="en-ZA">
+                    <a:noFill/>
+                  </a:rPr>
+                  <a:t> </a:t>
+                </a:r>
+              </a:p>
+            </p:txBody>
+          </p:sp>
+        </mc:Fallback>
+      </mc:AlternateContent>
+      <mc:AlternateContent xmlns:mc="http://schemas.openxmlformats.org/markup-compatibility/2006">
+        <mc:Choice xmlns:a14="http://schemas.microsoft.com/office/drawing/2010/main" Requires="a14">
+          <p:sp>
+            <p:nvSpPr>
+              <p:cNvPr id="19" name="TextBox 18">
+                <a:extLst>
+                  <a:ext uri="{FF2B5EF4-FFF2-40B4-BE49-F238E27FC236}">
+                    <a16:creationId xmlns:a16="http://schemas.microsoft.com/office/drawing/2014/main" id="{27A1AD92-EF06-47B1-9FBC-FBC72574971D}"/>
+                  </a:ext>
+                </a:extLst>
+              </p:cNvPr>
+              <p:cNvSpPr txBox="1"/>
+              <p:nvPr/>
+            </p:nvSpPr>
+            <p:spPr>
+              <a:xfrm>
+                <a:off x="5678813" y="4461691"/>
+                <a:ext cx="193258" cy="525978"/>
+              </a:xfrm>
+              <a:prstGeom prst="rect">
+                <a:avLst/>
+              </a:prstGeom>
+              <a:noFill/>
+            </p:spPr>
+            <p:txBody>
+              <a:bodyPr wrap="none" lIns="0" tIns="0" rIns="0" bIns="0" rtlCol="0">
+                <a:spAutoFit/>
+              </a:bodyPr>
+              <a:lstStyle/>
+              <a:p>
+                <a:pPr/>
+                <a14:m>
+                  <m:oMathPara xmlns:m="http://schemas.openxmlformats.org/officeDocument/2006/math">
+                    <m:oMathParaPr>
+                      <m:jc m:val="centerGroup"/>
+                    </m:oMathParaPr>
+                    <m:oMath xmlns:m="http://schemas.openxmlformats.org/officeDocument/2006/math">
+                      <m:f>
+                        <m:fPr>
+                          <m:ctrlPr>
+                            <a:rPr lang="en-ZA" i="1" smtClean="0">
+                              <a:latin typeface="Cambria Math" panose="02040503050406030204" pitchFamily="18" charset="0"/>
+                            </a:rPr>
+                          </m:ctrlPr>
+                        </m:fPr>
+                        <m:num>
+                          <m:r>
+                            <a:rPr lang="en-ZA" i="1" smtClean="0">
+                              <a:latin typeface="Cambria Math" panose="02040503050406030204" pitchFamily="18" charset="0"/>
+                              <a:ea typeface="Cambria Math" panose="02040503050406030204" pitchFamily="18" charset="0"/>
+                            </a:rPr>
+                            <m:t>𝜆</m:t>
+                          </m:r>
+                        </m:num>
+                        <m:den>
+                          <m:r>
+                            <a:rPr lang="en-ZA" b="0" i="1" smtClean="0">
+                              <a:latin typeface="Cambria Math" panose="02040503050406030204" pitchFamily="18" charset="0"/>
+                            </a:rPr>
+                            <m:t>𝑑</m:t>
+                          </m:r>
+                        </m:den>
+                      </m:f>
+                    </m:oMath>
+                  </m:oMathPara>
+                </a14:m>
+                <a:endParaRPr lang="en-ZA" dirty="0"/>
+              </a:p>
+            </p:txBody>
+          </p:sp>
+        </mc:Choice>
+        <mc:Fallback>
+          <p:sp>
+            <p:nvSpPr>
+              <p:cNvPr id="19" name="TextBox 18">
+                <a:extLst>
+                  <a:ext uri="{FF2B5EF4-FFF2-40B4-BE49-F238E27FC236}">
+                    <a16:creationId xmlns:a16="http://schemas.microsoft.com/office/drawing/2014/main" id="{27A1AD92-EF06-47B1-9FBC-FBC72574971D}"/>
+                  </a:ext>
+                </a:extLst>
+              </p:cNvPr>
+              <p:cNvSpPr txBox="1">
+                <a:spLocks noRot="1" noChangeAspect="1" noMove="1" noResize="1" noEditPoints="1" noAdjustHandles="1" noChangeArrowheads="1" noChangeShapeType="1" noTextEdit="1"/>
+              </p:cNvSpPr>
+              <p:nvPr/>
+            </p:nvSpPr>
+            <p:spPr>
+              <a:xfrm>
+                <a:off x="5678813" y="4461691"/>
+                <a:ext cx="193258" cy="525978"/>
+              </a:xfrm>
+              <a:prstGeom prst="rect">
+                <a:avLst/>
+              </a:prstGeom>
+              <a:blipFill>
+                <a:blip r:embed="rId5"/>
+                <a:stretch>
+                  <a:fillRect/>
+                </a:stretch>
+              </a:blipFill>
+            </p:spPr>
+            <p:txBody>
+              <a:bodyPr/>
+              <a:lstStyle/>
+              <a:p>
+                <a:r>
+                  <a:rPr lang="en-ZA">
+                    <a:noFill/>
+                  </a:rPr>
+                  <a:t> </a:t>
+                </a:r>
+              </a:p>
+            </p:txBody>
+          </p:sp>
+        </mc:Fallback>
+      </mc:AlternateContent>
+      <p:cxnSp>
+        <p:nvCxnSpPr>
+          <p:cNvPr id="20" name="Straight Arrow Connector 19">
+            <a:extLst>
+              <a:ext uri="{FF2B5EF4-FFF2-40B4-BE49-F238E27FC236}">
+                <a16:creationId xmlns:a16="http://schemas.microsoft.com/office/drawing/2014/main" id="{DD170550-68AE-4432-BB97-128E0A0DC6B7}"/>
+              </a:ext>
+            </a:extLst>
+          </p:cNvPr>
+          <p:cNvCxnSpPr>
+            <a:cxnSpLocks/>
+          </p:cNvCxnSpPr>
+          <p:nvPr/>
+        </p:nvCxnSpPr>
+        <p:spPr>
+          <a:xfrm>
+            <a:off x="5688832" y="5111532"/>
+            <a:ext cx="227366" cy="0"/>
+          </a:xfrm>
+          <a:prstGeom prst="straightConnector1">
+            <a:avLst/>
+          </a:prstGeom>
+          <a:ln>
+            <a:headEnd type="triangle"/>
+            <a:tailEnd type="triangle"/>
+          </a:ln>
+        </p:spPr>
+        <p:style>
+          <a:lnRef idx="3">
+            <a:schemeClr val="accent2"/>
+          </a:lnRef>
+          <a:fillRef idx="0">
+            <a:schemeClr val="accent2"/>
+          </a:fillRef>
+          <a:effectRef idx="2">
+            <a:schemeClr val="accent2"/>
+          </a:effectRef>
+          <a:fontRef idx="minor">
+            <a:schemeClr val="tx1"/>
+          </a:fontRef>
+        </p:style>
+      </p:cxnSp>
+      <p:cxnSp>
+        <p:nvCxnSpPr>
+          <p:cNvPr id="24" name="Straight Arrow Connector 23">
+            <a:extLst>
+              <a:ext uri="{FF2B5EF4-FFF2-40B4-BE49-F238E27FC236}">
+                <a16:creationId xmlns:a16="http://schemas.microsoft.com/office/drawing/2014/main" id="{A872C9F2-E558-4F70-8761-908123BD8CF6}"/>
+              </a:ext>
+            </a:extLst>
+          </p:cNvPr>
+          <p:cNvCxnSpPr/>
+          <p:nvPr/>
+        </p:nvCxnSpPr>
+        <p:spPr>
+          <a:xfrm>
+            <a:off x="5983550" y="2041864"/>
+            <a:ext cx="201667" cy="0"/>
+          </a:xfrm>
+          <a:prstGeom prst="straightConnector1">
+            <a:avLst/>
+          </a:prstGeom>
+          <a:ln>
+            <a:headEnd type="triangle"/>
+            <a:tailEnd type="triangle"/>
+          </a:ln>
+        </p:spPr>
+        <p:style>
+          <a:lnRef idx="3">
+            <a:schemeClr val="accent2"/>
+          </a:lnRef>
+          <a:fillRef idx="0">
+            <a:schemeClr val="accent2"/>
+          </a:fillRef>
+          <a:effectRef idx="2">
+            <a:schemeClr val="accent2"/>
+          </a:effectRef>
+          <a:fontRef idx="minor">
+            <a:schemeClr val="tx1"/>
+          </a:fontRef>
+        </p:style>
+      </p:cxnSp>
+      <p:sp>
+        <p:nvSpPr>
+          <p:cNvPr id="25" name="TextBox 24">
+            <a:extLst>
+              <a:ext uri="{FF2B5EF4-FFF2-40B4-BE49-F238E27FC236}">
+                <a16:creationId xmlns:a16="http://schemas.microsoft.com/office/drawing/2014/main" id="{F15BFF07-5DCC-432F-AAD5-3117DEFCD5EA}"/>
+              </a:ext>
+            </a:extLst>
+          </p:cNvPr>
+          <p:cNvSpPr txBox="1"/>
+          <p:nvPr/>
+        </p:nvSpPr>
+        <p:spPr>
+          <a:xfrm>
+            <a:off x="5904585" y="1515100"/>
+            <a:ext cx="227366" cy="369332"/>
+          </a:xfrm>
+          <a:prstGeom prst="rect">
+            <a:avLst/>
+          </a:prstGeom>
+          <a:noFill/>
+        </p:spPr>
+        <p:txBody>
+          <a:bodyPr wrap="square" rtlCol="0">
+            <a:spAutoFit/>
+          </a:bodyPr>
+          <a:lstStyle/>
+          <a:p>
+            <a:r>
+              <a:rPr lang="en-ZA" dirty="0"/>
+              <a:t>d</a:t>
+            </a:r>
+          </a:p>
+        </p:txBody>
+      </p:sp>
+      <p:cxnSp>
+        <p:nvCxnSpPr>
+          <p:cNvPr id="26" name="Straight Arrow Connector 25">
+            <a:extLst>
+              <a:ext uri="{FF2B5EF4-FFF2-40B4-BE49-F238E27FC236}">
+                <a16:creationId xmlns:a16="http://schemas.microsoft.com/office/drawing/2014/main" id="{4FFCC3B5-F4CF-4E97-9A10-038F2224A129}"/>
+              </a:ext>
+            </a:extLst>
+          </p:cNvPr>
+          <p:cNvCxnSpPr/>
+          <p:nvPr/>
+        </p:nvCxnSpPr>
+        <p:spPr>
+          <a:xfrm>
+            <a:off x="8437318" y="2041864"/>
+            <a:ext cx="201667" cy="0"/>
+          </a:xfrm>
+          <a:prstGeom prst="straightConnector1">
+            <a:avLst/>
+          </a:prstGeom>
+          <a:ln>
+            <a:headEnd type="triangle"/>
+            <a:tailEnd type="triangle"/>
+          </a:ln>
+        </p:spPr>
+        <p:style>
+          <a:lnRef idx="3">
+            <a:schemeClr val="accent2"/>
+          </a:lnRef>
+          <a:fillRef idx="0">
+            <a:schemeClr val="accent2"/>
+          </a:fillRef>
+          <a:effectRef idx="2">
+            <a:schemeClr val="accent2"/>
+          </a:effectRef>
+          <a:fontRef idx="minor">
+            <a:schemeClr val="tx1"/>
+          </a:fontRef>
+        </p:style>
+      </p:cxnSp>
+      <p:sp>
+        <p:nvSpPr>
+          <p:cNvPr id="27" name="TextBox 26">
+            <a:extLst>
+              <a:ext uri="{FF2B5EF4-FFF2-40B4-BE49-F238E27FC236}">
+                <a16:creationId xmlns:a16="http://schemas.microsoft.com/office/drawing/2014/main" id="{53F9AECD-5D67-4AB4-8C1C-09BB2965D592}"/>
+              </a:ext>
+            </a:extLst>
+          </p:cNvPr>
+          <p:cNvSpPr txBox="1"/>
+          <p:nvPr/>
+        </p:nvSpPr>
+        <p:spPr>
+          <a:xfrm>
+            <a:off x="8390429" y="1540947"/>
+            <a:ext cx="227366" cy="369332"/>
+          </a:xfrm>
+          <a:prstGeom prst="rect">
+            <a:avLst/>
+          </a:prstGeom>
+          <a:noFill/>
+        </p:spPr>
+        <p:txBody>
+          <a:bodyPr wrap="square" rtlCol="0">
+            <a:spAutoFit/>
+          </a:bodyPr>
+          <a:lstStyle/>
+          <a:p>
+            <a:r>
+              <a:rPr lang="en-ZA" dirty="0"/>
+              <a:t>d</a:t>
+            </a:r>
+          </a:p>
+        </p:txBody>
+      </p:sp>
+      <p:sp>
+        <p:nvSpPr>
+          <p:cNvPr id="29" name="TextBox 28">
+            <a:extLst>
+              <a:ext uri="{FF2B5EF4-FFF2-40B4-BE49-F238E27FC236}">
+                <a16:creationId xmlns:a16="http://schemas.microsoft.com/office/drawing/2014/main" id="{BCE28F77-D1AF-41BF-BE01-2C180D898896}"/>
+              </a:ext>
+            </a:extLst>
+          </p:cNvPr>
+          <p:cNvSpPr txBox="1"/>
+          <p:nvPr/>
+        </p:nvSpPr>
+        <p:spPr>
+          <a:xfrm>
+            <a:off x="3397532" y="1552755"/>
+            <a:ext cx="248575" cy="369332"/>
+          </a:xfrm>
+          <a:prstGeom prst="rect">
+            <a:avLst/>
+          </a:prstGeom>
+          <a:noFill/>
+        </p:spPr>
+        <p:txBody>
+          <a:bodyPr wrap="square" rtlCol="0">
+            <a:spAutoFit/>
+          </a:bodyPr>
+          <a:lstStyle/>
+          <a:p>
+            <a:r>
+              <a:rPr lang="en-ZA" dirty="0"/>
+              <a:t>N</a:t>
+            </a:r>
+          </a:p>
+        </p:txBody>
+      </p:sp>
+      <p:cxnSp>
+        <p:nvCxnSpPr>
+          <p:cNvPr id="31" name="Straight Arrow Connector 30">
+            <a:extLst>
+              <a:ext uri="{FF2B5EF4-FFF2-40B4-BE49-F238E27FC236}">
+                <a16:creationId xmlns:a16="http://schemas.microsoft.com/office/drawing/2014/main" id="{8EBB05A9-1E55-4D0E-87EC-C6B764FCD071}"/>
+              </a:ext>
+            </a:extLst>
+          </p:cNvPr>
+          <p:cNvCxnSpPr>
+            <a:cxnSpLocks/>
+          </p:cNvCxnSpPr>
+          <p:nvPr/>
+        </p:nvCxnSpPr>
+        <p:spPr>
+          <a:xfrm>
+            <a:off x="2965658" y="2041864"/>
+            <a:ext cx="1340527" cy="0"/>
+          </a:xfrm>
+          <a:prstGeom prst="straightConnector1">
+            <a:avLst/>
+          </a:prstGeom>
+          <a:ln>
+            <a:headEnd type="triangle"/>
+            <a:tailEnd type="triangle"/>
+          </a:ln>
+        </p:spPr>
+        <p:style>
+          <a:lnRef idx="3">
+            <a:schemeClr val="accent2"/>
+          </a:lnRef>
+          <a:fillRef idx="0">
+            <a:schemeClr val="accent2"/>
+          </a:fillRef>
+          <a:effectRef idx="2">
+            <a:schemeClr val="accent2"/>
+          </a:effectRef>
+          <a:fontRef idx="minor">
+            <a:schemeClr val="tx1"/>
+          </a:fontRef>
+        </p:style>
+      </p:cxnSp>
     </p:spTree>
     <p:extLst>
       <p:ext uri="{BB962C8B-B14F-4D97-AF65-F5344CB8AC3E}">
@@ -5057,8 +5847,8 @@
           </a:p>
         </p:txBody>
       </p:sp>
-      <mc:AlternateContent xmlns:mc="http://schemas.openxmlformats.org/markup-compatibility/2006">
-        <mc:Choice xmlns:a14="http://schemas.microsoft.com/office/drawing/2010/main" Requires="a14">
+      <mc:AlternateContent xmlns:mc="http://schemas.openxmlformats.org/markup-compatibility/2006" xmlns:a14="http://schemas.microsoft.com/office/drawing/2010/main">
+        <mc:Choice Requires="a14">
           <p:sp>
             <p:nvSpPr>
               <p:cNvPr id="10" name="TextBox 9">
@@ -5134,7 +5924,7 @@
             </p:txBody>
           </p:sp>
         </mc:Choice>
-        <mc:Fallback>
+        <mc:Fallback xmlns="">
           <p:sp>
             <p:nvSpPr>
               <p:cNvPr id="10" name="TextBox 9">
@@ -5179,8 +5969,8 @@
           </p:sp>
         </mc:Fallback>
       </mc:AlternateContent>
-      <mc:AlternateContent xmlns:mc="http://schemas.openxmlformats.org/markup-compatibility/2006">
-        <mc:Choice xmlns:a14="http://schemas.microsoft.com/office/drawing/2010/main" Requires="a14">
+      <mc:AlternateContent xmlns:mc="http://schemas.openxmlformats.org/markup-compatibility/2006" xmlns:a14="http://schemas.microsoft.com/office/drawing/2010/main">
+        <mc:Choice Requires="a14">
           <p:sp>
             <p:nvSpPr>
               <p:cNvPr id="17" name="TextBox 16">
@@ -5298,7 +6088,7 @@
             </p:txBody>
           </p:sp>
         </mc:Choice>
-        <mc:Fallback>
+        <mc:Fallback xmlns="">
           <p:sp>
             <p:nvSpPr>
               <p:cNvPr id="17" name="TextBox 16">
@@ -5343,6 +6133,60 @@
           </p:sp>
         </mc:Fallback>
       </mc:AlternateContent>
+      <p:sp>
+        <p:nvSpPr>
+          <p:cNvPr id="19" name="Rectangle 18">
+            <a:extLst>
+              <a:ext uri="{FF2B5EF4-FFF2-40B4-BE49-F238E27FC236}">
+                <a16:creationId xmlns:a16="http://schemas.microsoft.com/office/drawing/2014/main" id="{DF64307B-FAAA-4B60-8EC4-81EF9C43A67C}"/>
+              </a:ext>
+            </a:extLst>
+          </p:cNvPr>
+          <p:cNvSpPr/>
+          <p:nvPr/>
+        </p:nvSpPr>
+        <p:spPr>
+          <a:xfrm>
+            <a:off x="248575" y="443883"/>
+            <a:ext cx="401665" cy="1645920"/>
+          </a:xfrm>
+          <a:prstGeom prst="rect">
+            <a:avLst/>
+          </a:prstGeom>
+          <a:solidFill>
+            <a:schemeClr val="bg1"/>
+          </a:solidFill>
+          <a:ln>
+            <a:solidFill>
+              <a:schemeClr val="bg1"/>
+            </a:solidFill>
+          </a:ln>
+        </p:spPr>
+        <p:style>
+          <a:lnRef idx="2">
+            <a:schemeClr val="accent1">
+              <a:shade val="50000"/>
+            </a:schemeClr>
+          </a:lnRef>
+          <a:fillRef idx="1">
+            <a:schemeClr val="accent1"/>
+          </a:fillRef>
+          <a:effectRef idx="0">
+            <a:schemeClr val="accent1"/>
+          </a:effectRef>
+          <a:fontRef idx="minor">
+            <a:schemeClr val="lt1"/>
+          </a:fontRef>
+        </p:style>
+        <p:txBody>
+          <a:bodyPr rtlCol="0" anchor="ctr"/>
+          <a:lstStyle/>
+          <a:p>
+            <a:pPr algn="ctr"/>
+            <a:endParaRPr lang="en-ZA"/>
+          </a:p>
+        </p:txBody>
+      </p:sp>
     </p:spTree>
     <p:extLst>
       <p:ext uri="{BB962C8B-B14F-4D97-AF65-F5344CB8AC3E}">
@@ -5873,6 +6717,480 @@
           </a:p>
         </p:txBody>
       </p:sp>
+      <mc:AlternateContent xmlns:mc="http://schemas.openxmlformats.org/markup-compatibility/2006" xmlns:a14="http://schemas.microsoft.com/office/drawing/2010/main">
+        <mc:Choice Requires="a14">
+          <p:sp>
+            <p:nvSpPr>
+              <p:cNvPr id="3" name="TextBox 2">
+                <a:extLst>
+                  <a:ext uri="{FF2B5EF4-FFF2-40B4-BE49-F238E27FC236}">
+                    <a16:creationId xmlns:a16="http://schemas.microsoft.com/office/drawing/2014/main" id="{207E4331-6EE5-4685-8B67-8E7342BD65C9}"/>
+                  </a:ext>
+                </a:extLst>
+              </p:cNvPr>
+              <p:cNvSpPr txBox="1"/>
+              <p:nvPr/>
+            </p:nvSpPr>
+            <p:spPr>
+              <a:xfrm>
+                <a:off x="1101780" y="5047470"/>
+                <a:ext cx="1918602" cy="276999"/>
+              </a:xfrm>
+              <a:prstGeom prst="rect">
+                <a:avLst/>
+              </a:prstGeom>
+              <a:noFill/>
+            </p:spPr>
+            <p:txBody>
+              <a:bodyPr wrap="none" lIns="0" tIns="0" rIns="0" bIns="0" rtlCol="0">
+                <a:spAutoFit/>
+              </a:bodyPr>
+              <a:lstStyle/>
+              <a:p>
+                <a:pPr/>
+                <a14:m>
+                  <m:oMathPara xmlns:m="http://schemas.openxmlformats.org/officeDocument/2006/math">
+                    <m:oMathParaPr>
+                      <m:jc m:val="centerGroup"/>
+                    </m:oMathParaPr>
+                    <m:oMath xmlns:m="http://schemas.openxmlformats.org/officeDocument/2006/math">
+                      <m:sSub>
+                        <m:sSubPr>
+                          <m:ctrlPr>
+                            <a:rPr lang="en-ZA" b="0" i="1" smtClean="0">
+                              <a:latin typeface="Cambria Math" panose="02040503050406030204" pitchFamily="18" charset="0"/>
+                              <a:ea typeface="Cambria Math" panose="02040503050406030204" pitchFamily="18" charset="0"/>
+                            </a:rPr>
+                          </m:ctrlPr>
+                        </m:sSubPr>
+                        <m:e>
+                          <m:r>
+                            <a:rPr lang="en-ZA" i="1" smtClean="0">
+                              <a:latin typeface="Cambria Math" panose="02040503050406030204" pitchFamily="18" charset="0"/>
+                              <a:ea typeface="Cambria Math" panose="02040503050406030204" pitchFamily="18" charset="0"/>
+                            </a:rPr>
+                            <m:t>𝛼</m:t>
+                          </m:r>
+                        </m:e>
+                        <m:sub>
+                          <m:r>
+                            <a:rPr lang="en-ZA" b="0" i="1" smtClean="0">
+                              <a:latin typeface="Cambria Math" panose="02040503050406030204" pitchFamily="18" charset="0"/>
+                              <a:ea typeface="Cambria Math" panose="02040503050406030204" pitchFamily="18" charset="0"/>
+                            </a:rPr>
+                            <m:t>𝑚</m:t>
+                          </m:r>
+                        </m:sub>
+                      </m:sSub>
+                      <m:r>
+                        <a:rPr lang="en-ZA" b="0" i="1" smtClean="0">
+                          <a:latin typeface="Cambria Math" panose="02040503050406030204" pitchFamily="18" charset="0"/>
+                          <a:ea typeface="Cambria Math" panose="02040503050406030204" pitchFamily="18" charset="0"/>
+                        </a:rPr>
+                        <m:t>=−</m:t>
+                      </m:r>
+                      <m:r>
+                        <a:rPr lang="en-ZA" b="0" i="1" smtClean="0">
+                          <a:latin typeface="Cambria Math" panose="02040503050406030204" pitchFamily="18" charset="0"/>
+                          <a:ea typeface="Cambria Math" panose="02040503050406030204" pitchFamily="18" charset="0"/>
+                        </a:rPr>
+                        <m:t>𝑘</m:t>
+                      </m:r>
+                      <m:sSub>
+                        <m:sSubPr>
+                          <m:ctrlPr>
+                            <a:rPr lang="en-ZA" b="0" i="1" smtClean="0">
+                              <a:latin typeface="Cambria Math" panose="02040503050406030204" pitchFamily="18" charset="0"/>
+                              <a:ea typeface="Cambria Math" panose="02040503050406030204" pitchFamily="18" charset="0"/>
+                            </a:rPr>
+                          </m:ctrlPr>
+                        </m:sSubPr>
+                        <m:e>
+                          <m:r>
+                            <a:rPr lang="en-ZA" b="0" i="1" smtClean="0">
+                              <a:latin typeface="Cambria Math" panose="02040503050406030204" pitchFamily="18" charset="0"/>
+                              <a:ea typeface="Cambria Math" panose="02040503050406030204" pitchFamily="18" charset="0"/>
+                            </a:rPr>
+                            <m:t>𝑑</m:t>
+                          </m:r>
+                        </m:e>
+                        <m:sub>
+                          <m:r>
+                            <a:rPr lang="en-ZA" b="0" i="1" smtClean="0">
+                              <a:latin typeface="Cambria Math" panose="02040503050406030204" pitchFamily="18" charset="0"/>
+                              <a:ea typeface="Cambria Math" panose="02040503050406030204" pitchFamily="18" charset="0"/>
+                            </a:rPr>
+                            <m:t>𝑚</m:t>
+                          </m:r>
+                        </m:sub>
+                      </m:sSub>
+                      <m:func>
+                        <m:funcPr>
+                          <m:ctrlPr>
+                            <a:rPr lang="en-ZA" b="0" i="1" smtClean="0">
+                              <a:latin typeface="Cambria Math" panose="02040503050406030204" pitchFamily="18" charset="0"/>
+                              <a:ea typeface="Cambria Math" panose="02040503050406030204" pitchFamily="18" charset="0"/>
+                            </a:rPr>
+                          </m:ctrlPr>
+                        </m:funcPr>
+                        <m:fName>
+                          <m:r>
+                            <m:rPr>
+                              <m:sty m:val="p"/>
+                            </m:rPr>
+                            <a:rPr lang="en-ZA" b="0" i="0" smtClean="0">
+                              <a:latin typeface="Cambria Math" panose="02040503050406030204" pitchFamily="18" charset="0"/>
+                              <a:ea typeface="Cambria Math" panose="02040503050406030204" pitchFamily="18" charset="0"/>
+                            </a:rPr>
+                            <m:t>cos</m:t>
+                          </m:r>
+                        </m:fName>
+                        <m:e>
+                          <m:sSub>
+                            <m:sSubPr>
+                              <m:ctrlPr>
+                                <a:rPr lang="en-ZA" b="0" i="1" smtClean="0">
+                                  <a:latin typeface="Cambria Math" panose="02040503050406030204" pitchFamily="18" charset="0"/>
+                                  <a:ea typeface="Cambria Math" panose="02040503050406030204" pitchFamily="18" charset="0"/>
+                                </a:rPr>
+                              </m:ctrlPr>
+                            </m:sSubPr>
+                            <m:e>
+                              <m:r>
+                                <a:rPr lang="en-ZA" b="0" i="1" smtClean="0">
+                                  <a:latin typeface="Cambria Math" panose="02040503050406030204" pitchFamily="18" charset="0"/>
+                                  <a:ea typeface="Cambria Math" panose="02040503050406030204" pitchFamily="18" charset="0"/>
+                                </a:rPr>
+                                <m:t>𝜃</m:t>
+                              </m:r>
+                            </m:e>
+                            <m:sub>
+                              <m:r>
+                                <a:rPr lang="en-ZA" b="0" i="1" smtClean="0">
+                                  <a:latin typeface="Cambria Math" panose="02040503050406030204" pitchFamily="18" charset="0"/>
+                                  <a:ea typeface="Cambria Math" panose="02040503050406030204" pitchFamily="18" charset="0"/>
+                                </a:rPr>
+                                <m:t>𝑇</m:t>
+                              </m:r>
+                            </m:sub>
+                          </m:sSub>
+                        </m:e>
+                      </m:func>
+                    </m:oMath>
+                  </m:oMathPara>
+                </a14:m>
+                <a:endParaRPr lang="en-ZA" dirty="0"/>
+              </a:p>
+            </p:txBody>
+          </p:sp>
+        </mc:Choice>
+        <mc:Fallback xmlns="">
+          <p:sp>
+            <p:nvSpPr>
+              <p:cNvPr id="3" name="TextBox 2">
+                <a:extLst>
+                  <a:ext uri="{FF2B5EF4-FFF2-40B4-BE49-F238E27FC236}">
+                    <a16:creationId xmlns:a16="http://schemas.microsoft.com/office/drawing/2014/main" id="{207E4331-6EE5-4685-8B67-8E7342BD65C9}"/>
+                  </a:ext>
+                </a:extLst>
+              </p:cNvPr>
+              <p:cNvSpPr txBox="1">
+                <a:spLocks noRot="1" noChangeAspect="1" noMove="1" noResize="1" noEditPoints="1" noAdjustHandles="1" noChangeArrowheads="1" noChangeShapeType="1" noTextEdit="1"/>
+              </p:cNvSpPr>
+              <p:nvPr/>
+            </p:nvSpPr>
+            <p:spPr>
+              <a:xfrm>
+                <a:off x="1101780" y="5047470"/>
+                <a:ext cx="1918602" cy="276999"/>
+              </a:xfrm>
+              <a:prstGeom prst="rect">
+                <a:avLst/>
+              </a:prstGeom>
+              <a:blipFill>
+                <a:blip r:embed="rId7"/>
+                <a:stretch>
+                  <a:fillRect l="-1274" r="-318" b="-15556"/>
+                </a:stretch>
+              </a:blipFill>
+            </p:spPr>
+            <p:txBody>
+              <a:bodyPr/>
+              <a:lstStyle/>
+              <a:p>
+                <a:r>
+                  <a:rPr lang="en-ZA">
+                    <a:noFill/>
+                  </a:rPr>
+                  <a:t> </a:t>
+                </a:r>
+              </a:p>
+            </p:txBody>
+          </p:sp>
+        </mc:Fallback>
+      </mc:AlternateContent>
+      <mc:AlternateContent xmlns:mc="http://schemas.openxmlformats.org/markup-compatibility/2006" xmlns:a14="http://schemas.microsoft.com/office/drawing/2010/main">
+        <mc:Choice Requires="a14">
+          <p:sp>
+            <p:nvSpPr>
+              <p:cNvPr id="5" name="TextBox 4">
+                <a:extLst>
+                  <a:ext uri="{FF2B5EF4-FFF2-40B4-BE49-F238E27FC236}">
+                    <a16:creationId xmlns:a16="http://schemas.microsoft.com/office/drawing/2014/main" id="{10F262E6-81E5-4F9D-A87D-3752952B135B}"/>
+                  </a:ext>
+                </a:extLst>
+              </p:cNvPr>
+              <p:cNvSpPr txBox="1"/>
+              <p:nvPr/>
+            </p:nvSpPr>
+            <p:spPr>
+              <a:xfrm>
+                <a:off x="1052792" y="5574731"/>
+                <a:ext cx="1916550" cy="524118"/>
+              </a:xfrm>
+              <a:prstGeom prst="rect">
+                <a:avLst/>
+              </a:prstGeom>
+              <a:noFill/>
+            </p:spPr>
+            <p:txBody>
+              <a:bodyPr wrap="none" lIns="0" tIns="0" rIns="0" bIns="0" rtlCol="0">
+                <a:spAutoFit/>
+              </a:bodyPr>
+              <a:lstStyle/>
+              <a:p>
+                <a:pPr/>
+                <a14:m>
+                  <m:oMathPara xmlns:m="http://schemas.openxmlformats.org/officeDocument/2006/math">
+                    <m:oMathParaPr>
+                      <m:jc m:val="centerGroup"/>
+                    </m:oMathParaPr>
+                    <m:oMath xmlns:m="http://schemas.openxmlformats.org/officeDocument/2006/math">
+                      <m:r>
+                        <m:rPr>
+                          <m:sty m:val="p"/>
+                        </m:rPr>
+                        <a:rPr lang="el-GR" i="1" smtClean="0">
+                          <a:latin typeface="Cambria Math" panose="02040503050406030204" pitchFamily="18" charset="0"/>
+                          <a:ea typeface="Cambria Math" panose="02040503050406030204" pitchFamily="18" charset="0"/>
+                        </a:rPr>
+                        <m:t>Δ</m:t>
+                      </m:r>
+                      <m:r>
+                        <a:rPr lang="el-GR" i="1" smtClean="0">
+                          <a:latin typeface="Cambria Math" panose="02040503050406030204" pitchFamily="18" charset="0"/>
+                          <a:ea typeface="Cambria Math" panose="02040503050406030204" pitchFamily="18" charset="0"/>
+                        </a:rPr>
+                        <m:t>𝛾</m:t>
+                      </m:r>
+                      <m:r>
+                        <a:rPr lang="en-ZA" b="0" i="1" smtClean="0">
+                          <a:latin typeface="Cambria Math" panose="02040503050406030204" pitchFamily="18" charset="0"/>
+                          <a:ea typeface="Cambria Math" panose="02040503050406030204" pitchFamily="18" charset="0"/>
+                        </a:rPr>
+                        <m:t>= </m:t>
+                      </m:r>
+                      <m:f>
+                        <m:fPr>
+                          <m:ctrlPr>
+                            <a:rPr lang="en-ZA" b="0" i="1" smtClean="0">
+                              <a:latin typeface="Cambria Math" panose="02040503050406030204" pitchFamily="18" charset="0"/>
+                              <a:ea typeface="Cambria Math" panose="02040503050406030204" pitchFamily="18" charset="0"/>
+                            </a:rPr>
+                          </m:ctrlPr>
+                        </m:fPr>
+                        <m:num>
+                          <m:r>
+                            <a:rPr lang="en-ZA" b="0" i="1" smtClean="0">
+                              <a:latin typeface="Cambria Math" panose="02040503050406030204" pitchFamily="18" charset="0"/>
+                              <a:ea typeface="Cambria Math" panose="02040503050406030204" pitchFamily="18" charset="0"/>
+                            </a:rPr>
+                            <m:t>360 </m:t>
+                          </m:r>
+                          <m:r>
+                            <a:rPr lang="en-ZA" b="0" i="1" smtClean="0">
+                              <a:latin typeface="Cambria Math" panose="02040503050406030204" pitchFamily="18" charset="0"/>
+                              <a:ea typeface="Cambria Math" panose="02040503050406030204" pitchFamily="18" charset="0"/>
+                            </a:rPr>
+                            <m:t>𝑑</m:t>
+                          </m:r>
+                          <m:r>
+                            <a:rPr lang="en-ZA" b="0" i="1" smtClean="0">
+                              <a:latin typeface="Cambria Math" panose="02040503050406030204" pitchFamily="18" charset="0"/>
+                              <a:ea typeface="Cambria Math" panose="02040503050406030204" pitchFamily="18" charset="0"/>
+                            </a:rPr>
+                            <m:t> </m:t>
+                          </m:r>
+                          <m:func>
+                            <m:funcPr>
+                              <m:ctrlPr>
+                                <a:rPr lang="en-ZA" b="0" i="1" smtClean="0">
+                                  <a:latin typeface="Cambria Math" panose="02040503050406030204" pitchFamily="18" charset="0"/>
+                                  <a:ea typeface="Cambria Math" panose="02040503050406030204" pitchFamily="18" charset="0"/>
+                                </a:rPr>
+                              </m:ctrlPr>
+                            </m:funcPr>
+                            <m:fName>
+                              <m:r>
+                                <m:rPr>
+                                  <m:sty m:val="p"/>
+                                </m:rPr>
+                                <a:rPr lang="en-ZA" b="0" i="0" smtClean="0">
+                                  <a:latin typeface="Cambria Math" panose="02040503050406030204" pitchFamily="18" charset="0"/>
+                                  <a:ea typeface="Cambria Math" panose="02040503050406030204" pitchFamily="18" charset="0"/>
+                                </a:rPr>
+                                <m:t>sin</m:t>
+                              </m:r>
+                            </m:fName>
+                            <m:e>
+                              <m:sSub>
+                                <m:sSubPr>
+                                  <m:ctrlPr>
+                                    <a:rPr lang="en-ZA" b="0" i="1" smtClean="0">
+                                      <a:latin typeface="Cambria Math" panose="02040503050406030204" pitchFamily="18" charset="0"/>
+                                      <a:ea typeface="Cambria Math" panose="02040503050406030204" pitchFamily="18" charset="0"/>
+                                    </a:rPr>
+                                  </m:ctrlPr>
+                                </m:sSubPr>
+                                <m:e>
+                                  <m:r>
+                                    <a:rPr lang="en-ZA" b="0" i="1" smtClean="0">
+                                      <a:latin typeface="Cambria Math" panose="02040503050406030204" pitchFamily="18" charset="0"/>
+                                      <a:ea typeface="Cambria Math" panose="02040503050406030204" pitchFamily="18" charset="0"/>
+                                    </a:rPr>
+                                    <m:t>𝜃</m:t>
+                                  </m:r>
+                                </m:e>
+                                <m:sub>
+                                  <m:r>
+                                    <a:rPr lang="en-ZA" b="0" i="1" smtClean="0">
+                                      <a:latin typeface="Cambria Math" panose="02040503050406030204" pitchFamily="18" charset="0"/>
+                                      <a:ea typeface="Cambria Math" panose="02040503050406030204" pitchFamily="18" charset="0"/>
+                                    </a:rPr>
+                                    <m:t>𝑇</m:t>
+                                  </m:r>
+                                </m:sub>
+                              </m:sSub>
+                            </m:e>
+                          </m:func>
+                        </m:num>
+                        <m:den>
+                          <m:r>
+                            <a:rPr lang="en-ZA" b="0" i="1" smtClean="0">
+                              <a:latin typeface="Cambria Math" panose="02040503050406030204" pitchFamily="18" charset="0"/>
+                              <a:ea typeface="Cambria Math" panose="02040503050406030204" pitchFamily="18" charset="0"/>
+                            </a:rPr>
+                            <m:t>𝜆</m:t>
+                          </m:r>
+                        </m:den>
+                      </m:f>
+                    </m:oMath>
+                  </m:oMathPara>
+                </a14:m>
+                <a:endParaRPr lang="en-ZA" dirty="0"/>
+              </a:p>
+            </p:txBody>
+          </p:sp>
+        </mc:Choice>
+        <mc:Fallback xmlns="">
+          <p:sp>
+            <p:nvSpPr>
+              <p:cNvPr id="5" name="TextBox 4">
+                <a:extLst>
+                  <a:ext uri="{FF2B5EF4-FFF2-40B4-BE49-F238E27FC236}">
+                    <a16:creationId xmlns:a16="http://schemas.microsoft.com/office/drawing/2014/main" id="{10F262E6-81E5-4F9D-A87D-3752952B135B}"/>
+                  </a:ext>
+                </a:extLst>
+              </p:cNvPr>
+              <p:cNvSpPr txBox="1">
+                <a:spLocks noRot="1" noChangeAspect="1" noMove="1" noResize="1" noEditPoints="1" noAdjustHandles="1" noChangeArrowheads="1" noChangeShapeType="1" noTextEdit="1"/>
+              </p:cNvSpPr>
+              <p:nvPr/>
+            </p:nvSpPr>
+            <p:spPr>
+              <a:xfrm>
+                <a:off x="1052792" y="5574731"/>
+                <a:ext cx="1916550" cy="524118"/>
+              </a:xfrm>
+              <a:prstGeom prst="rect">
+                <a:avLst/>
+              </a:prstGeom>
+              <a:blipFill>
+                <a:blip r:embed="rId8"/>
+                <a:stretch>
+                  <a:fillRect/>
+                </a:stretch>
+              </a:blipFill>
+            </p:spPr>
+            <p:txBody>
+              <a:bodyPr/>
+              <a:lstStyle/>
+              <a:p>
+                <a:r>
+                  <a:rPr lang="en-ZA">
+                    <a:noFill/>
+                  </a:rPr>
+                  <a:t> </a:t>
+                </a:r>
+              </a:p>
+            </p:txBody>
+          </p:sp>
+        </mc:Fallback>
+      </mc:AlternateContent>
+      <p:sp>
+        <p:nvSpPr>
+          <p:cNvPr id="13" name="Rectangle 12">
+            <a:extLst>
+              <a:ext uri="{FF2B5EF4-FFF2-40B4-BE49-F238E27FC236}">
+                <a16:creationId xmlns:a16="http://schemas.microsoft.com/office/drawing/2014/main" id="{DA6C8E2A-EEC9-4127-A3AC-393F05B1C36D}"/>
+              </a:ext>
+            </a:extLst>
+          </p:cNvPr>
+          <p:cNvSpPr/>
+          <p:nvPr/>
+        </p:nvSpPr>
+        <p:spPr>
+          <a:xfrm>
+            <a:off x="248575" y="443883"/>
+            <a:ext cx="1189608" cy="700886"/>
+          </a:xfrm>
+          <a:prstGeom prst="rect">
+            <a:avLst/>
+          </a:prstGeom>
+          <a:solidFill>
+            <a:schemeClr val="bg1"/>
+          </a:solidFill>
+          <a:ln>
+            <a:solidFill>
+              <a:schemeClr val="bg1"/>
+            </a:solidFill>
+          </a:ln>
+        </p:spPr>
+        <p:style>
+          <a:lnRef idx="2">
+            <a:schemeClr val="accent1">
+              <a:shade val="50000"/>
+            </a:schemeClr>
+          </a:lnRef>
+          <a:fillRef idx="1">
+            <a:schemeClr val="accent1"/>
+          </a:fillRef>
+          <a:effectRef idx="0">
+            <a:schemeClr val="accent1"/>
+          </a:effectRef>
+          <a:fontRef idx="minor">
+            <a:schemeClr val="lt1"/>
+          </a:fontRef>
+        </p:style>
+        <p:txBody>
+          <a:bodyPr rtlCol="0" anchor="ctr"/>
+          <a:lstStyle/>
+          <a:p>
+            <a:pPr algn="ctr"/>
+            <a:endParaRPr lang="en-ZA"/>
+          </a:p>
+        </p:txBody>
+      </p:sp>
     </p:spTree>
     <p:extLst>
       <p:ext uri="{BB962C8B-B14F-4D97-AF65-F5344CB8AC3E}">
@@ -6818,7 +8136,7 @@
         </p:nvSpPr>
         <p:spPr>
           <a:xfrm>
-            <a:off x="968404" y="3888419"/>
+            <a:off x="1039795" y="3889444"/>
             <a:ext cx="2233474" cy="369332"/>
           </a:xfrm>
           <a:prstGeom prst="rect">
@@ -6834,7 +8152,7 @@
           <a:p>
             <a:r>
               <a:rPr lang="en-ZA" dirty="0"/>
-              <a:t>Non-uniform</a:t>
+              <a:t>Non-uniform LAA</a:t>
             </a:r>
           </a:p>
         </p:txBody>
@@ -7214,8 +8532,8 @@
           </a:p>
         </p:txBody>
       </p:sp>
-      <mc:AlternateContent xmlns:mc="http://schemas.openxmlformats.org/markup-compatibility/2006">
-        <mc:Choice xmlns:a14="http://schemas.microsoft.com/office/drawing/2010/main" Requires="a14">
+      <mc:AlternateContent xmlns:mc="http://schemas.openxmlformats.org/markup-compatibility/2006" xmlns:a14="http://schemas.microsoft.com/office/drawing/2010/main">
+        <mc:Choice Requires="a14">
           <p:sp>
             <p:nvSpPr>
               <p:cNvPr id="48" name="TextBox 47">
@@ -7244,6 +8562,7 @@
               </a:bodyPr>
               <a:lstStyle/>
               <a:p>
+                <a:pPr/>
                 <a14:m>
                   <m:oMathPara xmlns:m="http://schemas.openxmlformats.org/officeDocument/2006/math">
                     <m:oMathParaPr>
@@ -7283,7 +8602,7 @@
             </p:txBody>
           </p:sp>
         </mc:Choice>
-        <mc:Fallback>
+        <mc:Fallback xmlns="">
           <p:sp>
             <p:nvSpPr>
               <p:cNvPr id="48" name="TextBox 47">
@@ -7328,8 +8647,8 @@
           </p:sp>
         </mc:Fallback>
       </mc:AlternateContent>
-      <mc:AlternateContent xmlns:mc="http://schemas.openxmlformats.org/markup-compatibility/2006">
-        <mc:Choice xmlns:a14="http://schemas.microsoft.com/office/drawing/2010/main" Requires="a14">
+      <mc:AlternateContent xmlns:mc="http://schemas.openxmlformats.org/markup-compatibility/2006" xmlns:a14="http://schemas.microsoft.com/office/drawing/2010/main">
+        <mc:Choice Requires="a14">
           <p:sp>
             <p:nvSpPr>
               <p:cNvPr id="49" name="TextBox 48">
@@ -7358,6 +8677,7 @@
               </a:bodyPr>
               <a:lstStyle/>
               <a:p>
+                <a:pPr/>
                 <a14:m>
                   <m:oMathPara xmlns:m="http://schemas.openxmlformats.org/officeDocument/2006/math">
                     <m:oMathParaPr>
@@ -7397,7 +8717,7 @@
             </p:txBody>
           </p:sp>
         </mc:Choice>
-        <mc:Fallback>
+        <mc:Fallback xmlns="">
           <p:sp>
             <p:nvSpPr>
               <p:cNvPr id="49" name="TextBox 48">
@@ -7442,8 +8762,8 @@
           </p:sp>
         </mc:Fallback>
       </mc:AlternateContent>
-      <mc:AlternateContent xmlns:mc="http://schemas.openxmlformats.org/markup-compatibility/2006">
-        <mc:Choice xmlns:a14="http://schemas.microsoft.com/office/drawing/2010/main" Requires="a14">
+      <mc:AlternateContent xmlns:mc="http://schemas.openxmlformats.org/markup-compatibility/2006" xmlns:a14="http://schemas.microsoft.com/office/drawing/2010/main">
+        <mc:Choice Requires="a14">
           <p:sp>
             <p:nvSpPr>
               <p:cNvPr id="50" name="TextBox 49">
@@ -7472,6 +8792,7 @@
               </a:bodyPr>
               <a:lstStyle/>
               <a:p>
+                <a:pPr/>
                 <a14:m>
                   <m:oMathPara xmlns:m="http://schemas.openxmlformats.org/officeDocument/2006/math">
                     <m:oMathParaPr>
@@ -7511,7 +8832,7 @@
             </p:txBody>
           </p:sp>
         </mc:Choice>
-        <mc:Fallback>
+        <mc:Fallback xmlns="">
           <p:sp>
             <p:nvSpPr>
               <p:cNvPr id="50" name="TextBox 49">
@@ -7556,8 +8877,8 @@
           </p:sp>
         </mc:Fallback>
       </mc:AlternateContent>
-      <mc:AlternateContent xmlns:mc="http://schemas.openxmlformats.org/markup-compatibility/2006">
-        <mc:Choice xmlns:a14="http://schemas.microsoft.com/office/drawing/2010/main" Requires="a14">
+      <mc:AlternateContent xmlns:mc="http://schemas.openxmlformats.org/markup-compatibility/2006" xmlns:a14="http://schemas.microsoft.com/office/drawing/2010/main">
+        <mc:Choice Requires="a14">
           <p:sp>
             <p:nvSpPr>
               <p:cNvPr id="51" name="TextBox 50">
@@ -7586,6 +8907,7 @@
               </a:bodyPr>
               <a:lstStyle/>
               <a:p>
+                <a:pPr/>
                 <a14:m>
                   <m:oMathPara xmlns:m="http://schemas.openxmlformats.org/officeDocument/2006/math">
                     <m:oMathParaPr>
@@ -7625,7 +8947,7 @@
             </p:txBody>
           </p:sp>
         </mc:Choice>
-        <mc:Fallback>
+        <mc:Fallback xmlns="">
           <p:sp>
             <p:nvSpPr>
               <p:cNvPr id="51" name="TextBox 50">
@@ -7670,8 +8992,8 @@
           </p:sp>
         </mc:Fallback>
       </mc:AlternateContent>
-      <mc:AlternateContent xmlns:mc="http://schemas.openxmlformats.org/markup-compatibility/2006">
-        <mc:Choice xmlns:a14="http://schemas.microsoft.com/office/drawing/2010/main" Requires="a14">
+      <mc:AlternateContent xmlns:mc="http://schemas.openxmlformats.org/markup-compatibility/2006" xmlns:a14="http://schemas.microsoft.com/office/drawing/2010/main">
+        <mc:Choice Requires="a14">
           <p:sp>
             <p:nvSpPr>
               <p:cNvPr id="52" name="TextBox 51">
@@ -7700,6 +9022,7 @@
               </a:bodyPr>
               <a:lstStyle/>
               <a:p>
+                <a:pPr/>
                 <a14:m>
                   <m:oMathPara xmlns:m="http://schemas.openxmlformats.org/officeDocument/2006/math">
                     <m:oMathParaPr>
@@ -7739,7 +9062,7 @@
             </p:txBody>
           </p:sp>
         </mc:Choice>
-        <mc:Fallback>
+        <mc:Fallback xmlns="">
           <p:sp>
             <p:nvSpPr>
               <p:cNvPr id="52" name="TextBox 51">
@@ -8039,8 +9362,8 @@
           </a:p>
         </p:txBody>
       </p:sp>
-      <mc:AlternateContent xmlns:mc="http://schemas.openxmlformats.org/markup-compatibility/2006">
-        <mc:Choice xmlns:a14="http://schemas.microsoft.com/office/drawing/2010/main" Requires="a14">
+      <mc:AlternateContent xmlns:mc="http://schemas.openxmlformats.org/markup-compatibility/2006" xmlns:a14="http://schemas.microsoft.com/office/drawing/2010/main">
+        <mc:Choice Requires="a14">
           <p:sp>
             <p:nvSpPr>
               <p:cNvPr id="3" name="Content Placeholder 2">
@@ -8448,7 +9771,7 @@
             </p:txBody>
           </p:sp>
         </mc:Choice>
-        <mc:Fallback>
+        <mc:Fallback xmlns="">
           <p:sp>
             <p:nvSpPr>
               <p:cNvPr id="3" name="Content Placeholder 2">
@@ -8777,7 +10100,7 @@
           <a:p>
             <a:r>
               <a:rPr lang="en-US" sz="4000" dirty="0"/>
-              <a:t>Using the GA for beam steering </a:t>
+              <a:t>GA vs beam steering equation.</a:t>
             </a:r>
           </a:p>
         </p:txBody>
@@ -9463,6 +10786,491 @@
           </a:p>
         </p:txBody>
       </p:sp>
+      <mc:AlternateContent xmlns:mc="http://schemas.openxmlformats.org/markup-compatibility/2006" xmlns:a14="http://schemas.microsoft.com/office/drawing/2010/main">
+        <mc:Choice Requires="a14">
+          <p:sp>
+            <p:nvSpPr>
+              <p:cNvPr id="18" name="TextBox 17">
+                <a:extLst>
+                  <a:ext uri="{FF2B5EF4-FFF2-40B4-BE49-F238E27FC236}">
+                    <a16:creationId xmlns:a16="http://schemas.microsoft.com/office/drawing/2014/main" id="{C47DCCFA-A807-4042-9DFC-447E289AAC6D}"/>
+                  </a:ext>
+                </a:extLst>
+              </p:cNvPr>
+              <p:cNvSpPr txBox="1"/>
+              <p:nvPr/>
+            </p:nvSpPr>
+            <p:spPr>
+              <a:xfrm>
+                <a:off x="-890344" y="4471771"/>
+                <a:ext cx="6223247" cy="865750"/>
+              </a:xfrm>
+              <a:prstGeom prst="rect">
+                <a:avLst/>
+              </a:prstGeom>
+              <a:noFill/>
+            </p:spPr>
+            <p:txBody>
+              <a:bodyPr wrap="square" lIns="0" tIns="0" rIns="0" bIns="0" rtlCol="0">
+                <a:spAutoFit/>
+              </a:bodyPr>
+              <a:lstStyle/>
+              <a:p>
+                <a:pPr/>
+                <a14:m>
+                  <m:oMathPara xmlns:m="http://schemas.openxmlformats.org/officeDocument/2006/math">
+                    <m:oMathParaPr>
+                      <m:jc m:val="centerGroup"/>
+                    </m:oMathParaPr>
+                    <m:oMath xmlns:m="http://schemas.openxmlformats.org/officeDocument/2006/math">
+                      <m:r>
+                        <a:rPr lang="en-ZA" sz="2000" b="0" i="1" smtClean="0">
+                          <a:latin typeface="Cambria Math" panose="02040503050406030204" pitchFamily="18" charset="0"/>
+                        </a:rPr>
+                        <m:t>𝐴𝐹</m:t>
+                      </m:r>
+                      <m:r>
+                        <a:rPr lang="en-ZA" sz="2000" b="0" i="1" smtClean="0">
+                          <a:latin typeface="Cambria Math" panose="02040503050406030204" pitchFamily="18" charset="0"/>
+                        </a:rPr>
+                        <m:t>=</m:t>
+                      </m:r>
+                      <m:nary>
+                        <m:naryPr>
+                          <m:chr m:val="∑"/>
+                          <m:ctrlPr>
+                            <a:rPr lang="en-ZA" sz="2000" i="1">
+                              <a:latin typeface="Cambria Math" panose="02040503050406030204" pitchFamily="18" charset="0"/>
+                            </a:rPr>
+                          </m:ctrlPr>
+                        </m:naryPr>
+                        <m:sub>
+                          <m:r>
+                            <m:rPr>
+                              <m:brk m:alnAt="23"/>
+                            </m:rPr>
+                            <a:rPr lang="en-ZA" sz="2000" i="1">
+                              <a:latin typeface="Cambria Math" panose="02040503050406030204" pitchFamily="18" charset="0"/>
+                            </a:rPr>
+                            <m:t>𝑚</m:t>
+                          </m:r>
+                          <m:r>
+                            <a:rPr lang="en-ZA" sz="2000" i="1">
+                              <a:latin typeface="Cambria Math" panose="02040503050406030204" pitchFamily="18" charset="0"/>
+                            </a:rPr>
+                            <m:t>=0</m:t>
+                          </m:r>
+                        </m:sub>
+                        <m:sup>
+                          <m:r>
+                            <a:rPr lang="en-ZA" sz="2000" i="1">
+                              <a:latin typeface="Cambria Math" panose="02040503050406030204" pitchFamily="18" charset="0"/>
+                            </a:rPr>
+                            <m:t>𝑁</m:t>
+                          </m:r>
+                          <m:r>
+                            <a:rPr lang="en-ZA" sz="2000" i="1">
+                              <a:latin typeface="Cambria Math" panose="02040503050406030204" pitchFamily="18" charset="0"/>
+                            </a:rPr>
+                            <m:t>−1</m:t>
+                          </m:r>
+                        </m:sup>
+                        <m:e>
+                          <m:sSub>
+                            <m:sSubPr>
+                              <m:ctrlPr>
+                                <a:rPr lang="en-ZA" sz="2000" i="1">
+                                  <a:latin typeface="Cambria Math" panose="02040503050406030204" pitchFamily="18" charset="0"/>
+                                </a:rPr>
+                              </m:ctrlPr>
+                            </m:sSubPr>
+                            <m:e>
+                              <m:r>
+                                <a:rPr lang="en-ZA" sz="2000" i="1">
+                                  <a:latin typeface="Cambria Math" panose="02040503050406030204" pitchFamily="18" charset="0"/>
+                                </a:rPr>
+                                <m:t>𝐼</m:t>
+                              </m:r>
+                            </m:e>
+                            <m:sub>
+                              <m:r>
+                                <a:rPr lang="en-ZA" sz="2000" i="1">
+                                  <a:latin typeface="Cambria Math" panose="02040503050406030204" pitchFamily="18" charset="0"/>
+                                </a:rPr>
+                                <m:t>𝑚</m:t>
+                              </m:r>
+                            </m:sub>
+                          </m:sSub>
+                          <m:sSup>
+                            <m:sSupPr>
+                              <m:ctrlPr>
+                                <a:rPr lang="en-ZA" sz="2000" i="1">
+                                  <a:latin typeface="Cambria Math" panose="02040503050406030204" pitchFamily="18" charset="0"/>
+                                </a:rPr>
+                              </m:ctrlPr>
+                            </m:sSupPr>
+                            <m:e>
+                              <m:r>
+                                <a:rPr lang="en-ZA" sz="2000" i="1">
+                                  <a:latin typeface="Cambria Math" panose="02040503050406030204" pitchFamily="18" charset="0"/>
+                                </a:rPr>
+                                <m:t>𝑒</m:t>
+                              </m:r>
+                            </m:e>
+                            <m:sup>
+                              <m:r>
+                                <a:rPr lang="en-ZA" sz="2000" i="1">
+                                  <a:latin typeface="Cambria Math" panose="02040503050406030204" pitchFamily="18" charset="0"/>
+                                </a:rPr>
+                                <m:t>𝑗</m:t>
+                              </m:r>
+                              <m:sSub>
+                                <m:sSubPr>
+                                  <m:ctrlPr>
+                                    <a:rPr lang="en-ZA" sz="2000" b="0" i="1" smtClean="0">
+                                      <a:latin typeface="Cambria Math" panose="02040503050406030204" pitchFamily="18" charset="0"/>
+                                      <a:ea typeface="Cambria Math" panose="02040503050406030204" pitchFamily="18" charset="0"/>
+                                    </a:rPr>
+                                  </m:ctrlPr>
+                                </m:sSubPr>
+                                <m:e>
+                                  <m:r>
+                                    <a:rPr lang="en-ZA" sz="2000" i="1" smtClean="0">
+                                      <a:latin typeface="Cambria Math" panose="02040503050406030204" pitchFamily="18" charset="0"/>
+                                      <a:ea typeface="Cambria Math" panose="02040503050406030204" pitchFamily="18" charset="0"/>
+                                    </a:rPr>
+                                    <m:t>𝛾</m:t>
+                                  </m:r>
+                                </m:e>
+                                <m:sub>
+                                  <m:r>
+                                    <a:rPr lang="en-ZA" sz="2000" b="0" i="1" smtClean="0">
+                                      <a:latin typeface="Cambria Math" panose="02040503050406030204" pitchFamily="18" charset="0"/>
+                                      <a:ea typeface="Cambria Math" panose="02040503050406030204" pitchFamily="18" charset="0"/>
+                                    </a:rPr>
+                                    <m:t>𝑚</m:t>
+                                  </m:r>
+                                </m:sub>
+                              </m:sSub>
+                            </m:sup>
+                          </m:sSup>
+                        </m:e>
+                      </m:nary>
+                    </m:oMath>
+                  </m:oMathPara>
+                </a14:m>
+                <a:endParaRPr lang="en-ZA" sz="2000" dirty="0"/>
+              </a:p>
+            </p:txBody>
+          </p:sp>
+        </mc:Choice>
+        <mc:Fallback xmlns="">
+          <p:sp>
+            <p:nvSpPr>
+              <p:cNvPr id="18" name="TextBox 17">
+                <a:extLst>
+                  <a:ext uri="{FF2B5EF4-FFF2-40B4-BE49-F238E27FC236}">
+                    <a16:creationId xmlns:a16="http://schemas.microsoft.com/office/drawing/2014/main" id="{C47DCCFA-A807-4042-9DFC-447E289AAC6D}"/>
+                  </a:ext>
+                </a:extLst>
+              </p:cNvPr>
+              <p:cNvSpPr txBox="1">
+                <a:spLocks noRot="1" noChangeAspect="1" noMove="1" noResize="1" noEditPoints="1" noAdjustHandles="1" noChangeArrowheads="1" noChangeShapeType="1" noTextEdit="1"/>
+              </p:cNvSpPr>
+              <p:nvPr/>
+            </p:nvSpPr>
+            <p:spPr>
+              <a:xfrm>
+                <a:off x="-890344" y="4471771"/>
+                <a:ext cx="6223247" cy="865750"/>
+              </a:xfrm>
+              <a:prstGeom prst="rect">
+                <a:avLst/>
+              </a:prstGeom>
+              <a:blipFill>
+                <a:blip r:embed="rId6"/>
+                <a:stretch>
+                  <a:fillRect/>
+                </a:stretch>
+              </a:blipFill>
+            </p:spPr>
+            <p:txBody>
+              <a:bodyPr/>
+              <a:lstStyle/>
+              <a:p>
+                <a:r>
+                  <a:rPr lang="en-ZA">
+                    <a:noFill/>
+                  </a:rPr>
+                  <a:t> </a:t>
+                </a:r>
+              </a:p>
+            </p:txBody>
+          </p:sp>
+        </mc:Fallback>
+      </mc:AlternateContent>
+      <mc:AlternateContent xmlns:mc="http://schemas.openxmlformats.org/markup-compatibility/2006" xmlns:a14="http://schemas.microsoft.com/office/drawing/2010/main">
+        <mc:Choice Requires="a14">
+          <p:sp>
+            <p:nvSpPr>
+              <p:cNvPr id="24" name="TextBox 23">
+                <a:extLst>
+                  <a:ext uri="{FF2B5EF4-FFF2-40B4-BE49-F238E27FC236}">
+                    <a16:creationId xmlns:a16="http://schemas.microsoft.com/office/drawing/2014/main" id="{2220DB8D-B273-4C18-A989-2098D8D23648}"/>
+                  </a:ext>
+                </a:extLst>
+              </p:cNvPr>
+              <p:cNvSpPr txBox="1"/>
+              <p:nvPr/>
+            </p:nvSpPr>
+            <p:spPr>
+              <a:xfrm>
+                <a:off x="1052792" y="5574731"/>
+                <a:ext cx="1916550" cy="524118"/>
+              </a:xfrm>
+              <a:prstGeom prst="rect">
+                <a:avLst/>
+              </a:prstGeom>
+              <a:noFill/>
+            </p:spPr>
+            <p:txBody>
+              <a:bodyPr wrap="none" lIns="0" tIns="0" rIns="0" bIns="0" rtlCol="0">
+                <a:spAutoFit/>
+              </a:bodyPr>
+              <a:lstStyle/>
+              <a:p>
+                <a:pPr/>
+                <a14:m>
+                  <m:oMathPara xmlns:m="http://schemas.openxmlformats.org/officeDocument/2006/math">
+                    <m:oMathParaPr>
+                      <m:jc m:val="centerGroup"/>
+                    </m:oMathParaPr>
+                    <m:oMath xmlns:m="http://schemas.openxmlformats.org/officeDocument/2006/math">
+                      <m:r>
+                        <m:rPr>
+                          <m:sty m:val="p"/>
+                        </m:rPr>
+                        <a:rPr lang="el-GR" i="1" smtClean="0">
+                          <a:latin typeface="Cambria Math" panose="02040503050406030204" pitchFamily="18" charset="0"/>
+                          <a:ea typeface="Cambria Math" panose="02040503050406030204" pitchFamily="18" charset="0"/>
+                        </a:rPr>
+                        <m:t>Δ</m:t>
+                      </m:r>
+                      <m:r>
+                        <a:rPr lang="el-GR" i="1" smtClean="0">
+                          <a:latin typeface="Cambria Math" panose="02040503050406030204" pitchFamily="18" charset="0"/>
+                          <a:ea typeface="Cambria Math" panose="02040503050406030204" pitchFamily="18" charset="0"/>
+                        </a:rPr>
+                        <m:t>𝛾</m:t>
+                      </m:r>
+                      <m:r>
+                        <a:rPr lang="en-ZA" b="0" i="1" smtClean="0">
+                          <a:latin typeface="Cambria Math" panose="02040503050406030204" pitchFamily="18" charset="0"/>
+                          <a:ea typeface="Cambria Math" panose="02040503050406030204" pitchFamily="18" charset="0"/>
+                        </a:rPr>
+                        <m:t>= </m:t>
+                      </m:r>
+                      <m:f>
+                        <m:fPr>
+                          <m:ctrlPr>
+                            <a:rPr lang="en-ZA" b="0" i="1" smtClean="0">
+                              <a:latin typeface="Cambria Math" panose="02040503050406030204" pitchFamily="18" charset="0"/>
+                              <a:ea typeface="Cambria Math" panose="02040503050406030204" pitchFamily="18" charset="0"/>
+                            </a:rPr>
+                          </m:ctrlPr>
+                        </m:fPr>
+                        <m:num>
+                          <m:r>
+                            <a:rPr lang="en-ZA" b="0" i="1" smtClean="0">
+                              <a:latin typeface="Cambria Math" panose="02040503050406030204" pitchFamily="18" charset="0"/>
+                              <a:ea typeface="Cambria Math" panose="02040503050406030204" pitchFamily="18" charset="0"/>
+                            </a:rPr>
+                            <m:t>360 </m:t>
+                          </m:r>
+                          <m:r>
+                            <a:rPr lang="en-ZA" b="0" i="1" smtClean="0">
+                              <a:latin typeface="Cambria Math" panose="02040503050406030204" pitchFamily="18" charset="0"/>
+                              <a:ea typeface="Cambria Math" panose="02040503050406030204" pitchFamily="18" charset="0"/>
+                            </a:rPr>
+                            <m:t>𝑑</m:t>
+                          </m:r>
+                          <m:r>
+                            <a:rPr lang="en-ZA" b="0" i="1" smtClean="0">
+                              <a:latin typeface="Cambria Math" panose="02040503050406030204" pitchFamily="18" charset="0"/>
+                              <a:ea typeface="Cambria Math" panose="02040503050406030204" pitchFamily="18" charset="0"/>
+                            </a:rPr>
+                            <m:t> </m:t>
+                          </m:r>
+                          <m:func>
+                            <m:funcPr>
+                              <m:ctrlPr>
+                                <a:rPr lang="en-ZA" b="0" i="1" smtClean="0">
+                                  <a:latin typeface="Cambria Math" panose="02040503050406030204" pitchFamily="18" charset="0"/>
+                                  <a:ea typeface="Cambria Math" panose="02040503050406030204" pitchFamily="18" charset="0"/>
+                                </a:rPr>
+                              </m:ctrlPr>
+                            </m:funcPr>
+                            <m:fName>
+                              <m:r>
+                                <m:rPr>
+                                  <m:sty m:val="p"/>
+                                </m:rPr>
+                                <a:rPr lang="en-ZA" b="0" i="0" smtClean="0">
+                                  <a:latin typeface="Cambria Math" panose="02040503050406030204" pitchFamily="18" charset="0"/>
+                                  <a:ea typeface="Cambria Math" panose="02040503050406030204" pitchFamily="18" charset="0"/>
+                                </a:rPr>
+                                <m:t>sin</m:t>
+                              </m:r>
+                            </m:fName>
+                            <m:e>
+                              <m:sSub>
+                                <m:sSubPr>
+                                  <m:ctrlPr>
+                                    <a:rPr lang="en-ZA" b="0" i="1" smtClean="0">
+                                      <a:latin typeface="Cambria Math" panose="02040503050406030204" pitchFamily="18" charset="0"/>
+                                      <a:ea typeface="Cambria Math" panose="02040503050406030204" pitchFamily="18" charset="0"/>
+                                    </a:rPr>
+                                  </m:ctrlPr>
+                                </m:sSubPr>
+                                <m:e>
+                                  <m:r>
+                                    <a:rPr lang="en-ZA" b="0" i="1" smtClean="0">
+                                      <a:latin typeface="Cambria Math" panose="02040503050406030204" pitchFamily="18" charset="0"/>
+                                      <a:ea typeface="Cambria Math" panose="02040503050406030204" pitchFamily="18" charset="0"/>
+                                    </a:rPr>
+                                    <m:t>𝜃</m:t>
+                                  </m:r>
+                                </m:e>
+                                <m:sub>
+                                  <m:r>
+                                    <a:rPr lang="en-ZA" b="0" i="1" smtClean="0">
+                                      <a:latin typeface="Cambria Math" panose="02040503050406030204" pitchFamily="18" charset="0"/>
+                                      <a:ea typeface="Cambria Math" panose="02040503050406030204" pitchFamily="18" charset="0"/>
+                                    </a:rPr>
+                                    <m:t>𝑇</m:t>
+                                  </m:r>
+                                </m:sub>
+                              </m:sSub>
+                            </m:e>
+                          </m:func>
+                        </m:num>
+                        <m:den>
+                          <m:r>
+                            <a:rPr lang="en-ZA" b="0" i="1" smtClean="0">
+                              <a:latin typeface="Cambria Math" panose="02040503050406030204" pitchFamily="18" charset="0"/>
+                              <a:ea typeface="Cambria Math" panose="02040503050406030204" pitchFamily="18" charset="0"/>
+                            </a:rPr>
+                            <m:t>𝜆</m:t>
+                          </m:r>
+                        </m:den>
+                      </m:f>
+                    </m:oMath>
+                  </m:oMathPara>
+                </a14:m>
+                <a:endParaRPr lang="en-ZA" dirty="0"/>
+              </a:p>
+            </p:txBody>
+          </p:sp>
+        </mc:Choice>
+        <mc:Fallback xmlns="">
+          <p:sp>
+            <p:nvSpPr>
+              <p:cNvPr id="24" name="TextBox 23">
+                <a:extLst>
+                  <a:ext uri="{FF2B5EF4-FFF2-40B4-BE49-F238E27FC236}">
+                    <a16:creationId xmlns:a16="http://schemas.microsoft.com/office/drawing/2014/main" id="{2220DB8D-B273-4C18-A989-2098D8D23648}"/>
+                  </a:ext>
+                </a:extLst>
+              </p:cNvPr>
+              <p:cNvSpPr txBox="1">
+                <a:spLocks noRot="1" noChangeAspect="1" noMove="1" noResize="1" noEditPoints="1" noAdjustHandles="1" noChangeArrowheads="1" noChangeShapeType="1" noTextEdit="1"/>
+              </p:cNvSpPr>
+              <p:nvPr/>
+            </p:nvSpPr>
+            <p:spPr>
+              <a:xfrm>
+                <a:off x="1052792" y="5574731"/>
+                <a:ext cx="1916550" cy="524118"/>
+              </a:xfrm>
+              <a:prstGeom prst="rect">
+                <a:avLst/>
+              </a:prstGeom>
+              <a:blipFill>
+                <a:blip r:embed="rId7"/>
+                <a:stretch>
+                  <a:fillRect/>
+                </a:stretch>
+              </a:blipFill>
+            </p:spPr>
+            <p:txBody>
+              <a:bodyPr/>
+              <a:lstStyle/>
+              <a:p>
+                <a:r>
+                  <a:rPr lang="en-ZA">
+                    <a:noFill/>
+                  </a:rPr>
+                  <a:t> </a:t>
+                </a:r>
+              </a:p>
+            </p:txBody>
+          </p:sp>
+        </mc:Fallback>
+      </mc:AlternateContent>
+      <p:sp>
+        <p:nvSpPr>
+          <p:cNvPr id="3" name="Rectangle 2">
+            <a:extLst>
+              <a:ext uri="{FF2B5EF4-FFF2-40B4-BE49-F238E27FC236}">
+                <a16:creationId xmlns:a16="http://schemas.microsoft.com/office/drawing/2014/main" id="{3F38A8EE-5C12-40A1-BA45-50B1040EBC20}"/>
+              </a:ext>
+            </a:extLst>
+          </p:cNvPr>
+          <p:cNvSpPr/>
+          <p:nvPr/>
+        </p:nvSpPr>
+        <p:spPr>
+          <a:xfrm>
+            <a:off x="248575" y="443883"/>
+            <a:ext cx="1189608" cy="700886"/>
+          </a:xfrm>
+          <a:prstGeom prst="rect">
+            <a:avLst/>
+          </a:prstGeom>
+          <a:solidFill>
+            <a:schemeClr val="bg1"/>
+          </a:solidFill>
+          <a:ln>
+            <a:solidFill>
+              <a:schemeClr val="bg1"/>
+            </a:solidFill>
+          </a:ln>
+        </p:spPr>
+        <p:style>
+          <a:lnRef idx="2">
+            <a:schemeClr val="accent1">
+              <a:shade val="50000"/>
+            </a:schemeClr>
+          </a:lnRef>
+          <a:fillRef idx="1">
+            <a:schemeClr val="accent1"/>
+          </a:fillRef>
+          <a:effectRef idx="0">
+            <a:schemeClr val="accent1"/>
+          </a:effectRef>
+          <a:fontRef idx="minor">
+            <a:schemeClr val="lt1"/>
+          </a:fontRef>
+        </p:style>
+        <p:txBody>
+          <a:bodyPr rtlCol="0" anchor="ctr"/>
+          <a:lstStyle/>
+          <a:p>
+            <a:pPr algn="ctr"/>
+            <a:endParaRPr lang="en-ZA"/>
+          </a:p>
+        </p:txBody>
+      </p:sp>
     </p:spTree>
     <p:extLst>
       <p:ext uri="{BB962C8B-B14F-4D97-AF65-F5344CB8AC3E}">
@@ -9551,8 +11359,8 @@
         </p:blipFill>
         <p:spPr>
           <a:xfrm>
-            <a:off x="207523" y="1722542"/>
-            <a:ext cx="6520324" cy="4890243"/>
+            <a:off x="207523" y="1722543"/>
+            <a:ext cx="6172827" cy="4629620"/>
           </a:xfrm>
         </p:spPr>
       </p:pic>
@@ -9570,8 +11378,8 @@
         </p:nvSpPr>
         <p:spPr>
           <a:xfrm>
-            <a:off x="7146072" y="1901723"/>
-            <a:ext cx="4807084" cy="646331"/>
+            <a:off x="471831" y="6384017"/>
+            <a:ext cx="4807084" cy="369332"/>
           </a:xfrm>
           <a:prstGeom prst="rect">
             <a:avLst/>
@@ -9586,77 +11394,7 @@
           <a:p>
             <a:r>
               <a:rPr lang="en-ZA" dirty="0"/>
-              <a:t>Antenna elements are spaced 1 wavelength apart. 21.21 dB (159.59%)</a:t>
-            </a:r>
-          </a:p>
-        </p:txBody>
-      </p:sp>
-      <p:sp>
-        <p:nvSpPr>
-          <p:cNvPr id="10" name="TextBox 9">
-            <a:extLst>
-              <a:ext uri="{FF2B5EF4-FFF2-40B4-BE49-F238E27FC236}">
-                <a16:creationId xmlns:a16="http://schemas.microsoft.com/office/drawing/2014/main" id="{19B1DB3E-A31F-4E34-9880-31E848B9011A}"/>
-              </a:ext>
-            </a:extLst>
-          </p:cNvPr>
-          <p:cNvSpPr txBox="1"/>
-          <p:nvPr/>
-        </p:nvSpPr>
-        <p:spPr>
-          <a:xfrm>
-            <a:off x="7146071" y="2585628"/>
-            <a:ext cx="4176408" cy="923330"/>
-          </a:xfrm>
-          <a:prstGeom prst="rect">
-            <a:avLst/>
-          </a:prstGeom>
-          <a:noFill/>
-        </p:spPr>
-        <p:txBody>
-          <a:bodyPr wrap="square" rtlCol="0">
-            <a:spAutoFit/>
-          </a:bodyPr>
-          <a:lstStyle/>
-          <a:p>
-            <a:r>
-              <a:rPr lang="en-ZA" dirty="0"/>
-              <a:t>Grating lobes are note suppressed when altering the amplitude of the signal entering each antenna elements. </a:t>
-            </a:r>
-          </a:p>
-        </p:txBody>
-      </p:sp>
-      <p:sp>
-        <p:nvSpPr>
-          <p:cNvPr id="11" name="TextBox 10">
-            <a:extLst>
-              <a:ext uri="{FF2B5EF4-FFF2-40B4-BE49-F238E27FC236}">
-                <a16:creationId xmlns:a16="http://schemas.microsoft.com/office/drawing/2014/main" id="{0A305332-16D0-4CDC-9DB2-3813B1A16E0A}"/>
-              </a:ext>
-            </a:extLst>
-          </p:cNvPr>
-          <p:cNvSpPr txBox="1"/>
-          <p:nvPr/>
-        </p:nvSpPr>
-        <p:spPr>
-          <a:xfrm>
-            <a:off x="7146071" y="3651241"/>
-            <a:ext cx="4176408" cy="646331"/>
-          </a:xfrm>
-          <a:prstGeom prst="rect">
-            <a:avLst/>
-          </a:prstGeom>
-          <a:noFill/>
-        </p:spPr>
-        <p:txBody>
-          <a:bodyPr wrap="square" rtlCol="0">
-            <a:spAutoFit/>
-          </a:bodyPr>
-          <a:lstStyle/>
-          <a:p>
-            <a:r>
-              <a:rPr lang="en-ZA" dirty="0"/>
-              <a:t>As predicted the amplitude distribution  affects the size of the HPBW. </a:t>
+              <a:t>21.21 dB (159.59%) reduction in SLL</a:t>
             </a:r>
           </a:p>
         </p:txBody>
@@ -9676,13 +11414,13 @@
           <p:nvPr>
             <p:extLst>
               <p:ext uri="{D42A27DB-BD31-4B8C-83A1-F6EECF244321}">
-                <p14:modId xmlns:p14="http://schemas.microsoft.com/office/powerpoint/2010/main" val="3220594566"/>
+                <p14:modId xmlns:p14="http://schemas.microsoft.com/office/powerpoint/2010/main" val="1848659126"/>
               </p:ext>
             </p:extLst>
           </p:nvPr>
         </p:nvGraphicFramePr>
         <p:xfrm>
-          <a:off x="7300648" y="4439855"/>
+          <a:off x="7542163" y="1690688"/>
           <a:ext cx="3019394" cy="1828800"/>
         </p:xfrm>
         <a:graphic>
@@ -9860,7 +11598,7 @@
                     <a:p>
                       <a:r>
                         <a:rPr lang="en-ZA" dirty="0"/>
-                        <a:t>-35.3</a:t>
+                        <a:t>-34.7</a:t>
                       </a:r>
                     </a:p>
                   </a:txBody>
@@ -9876,6 +11614,36 @@
           </a:graphicData>
         </a:graphic>
       </p:graphicFrame>
+      <p:pic>
+        <p:nvPicPr>
+          <p:cNvPr id="7" name="Picture 6">
+            <a:extLst>
+              <a:ext uri="{FF2B5EF4-FFF2-40B4-BE49-F238E27FC236}">
+                <a16:creationId xmlns:a16="http://schemas.microsoft.com/office/drawing/2014/main" id="{4859694B-DC98-48B3-8618-11E60B77AE12}"/>
+              </a:ext>
+            </a:extLst>
+          </p:cNvPr>
+          <p:cNvPicPr>
+            <a:picLocks noChangeAspect="1"/>
+          </p:cNvPicPr>
+          <p:nvPr/>
+        </p:nvPicPr>
+        <p:blipFill>
+          <a:blip r:embed="rId3"/>
+          <a:stretch>
+            <a:fillRect/>
+          </a:stretch>
+        </p:blipFill>
+        <p:spPr>
+          <a:xfrm>
+            <a:off x="6096000" y="3849425"/>
+            <a:ext cx="5911721" cy="2719258"/>
+          </a:xfrm>
+          <a:prstGeom prst="rect">
+            <a:avLst/>
+          </a:prstGeom>
+        </p:spPr>
+      </p:pic>
     </p:spTree>
     <p:extLst>
       <p:ext uri="{BB962C8B-B14F-4D97-AF65-F5344CB8AC3E}">
@@ -10220,7 +11988,7 @@
           <a:lstStyle/>
           <a:p>
             <a:r>
-              <a:rPr lang="en-ZA" sz="4000"/>
+              <a:rPr lang="en-ZA" sz="4000" dirty="0"/>
               <a:t>Introduction</a:t>
             </a:r>
           </a:p>
@@ -10244,8 +12012,8 @@
         </p:nvSpPr>
         <p:spPr>
           <a:xfrm>
-            <a:off x="965200" y="2470248"/>
-            <a:ext cx="4048344" cy="3536236"/>
+            <a:off x="965199" y="2479126"/>
+            <a:ext cx="4663243" cy="3536236"/>
           </a:xfrm>
         </p:spPr>
         <p:txBody>
@@ -10255,14 +12023,52 @@
           <a:lstStyle/>
           <a:p>
             <a:r>
-              <a:rPr lang="en-US" sz="2400"/>
-              <a:t>Antennas are designed to radiate Electromagnetic energy. </a:t>
-            </a:r>
-          </a:p>
-          <a:p>
-            <a:r>
-              <a:rPr lang="en-US" sz="2400"/>
-              <a:t>It is used for long-distance communication and transmitting of data. </a:t>
+              <a:rPr lang="en-US" sz="2400" dirty="0"/>
+              <a:t>Antennas are designed to radiate </a:t>
+            </a:r>
+            <a:r>
+              <a:rPr lang="en-US" sz="2400" b="1" dirty="0"/>
+              <a:t>Electromagnetic energy</a:t>
+            </a:r>
+            <a:r>
+              <a:rPr lang="en-US" sz="2400" dirty="0"/>
+              <a:t>. </a:t>
+            </a:r>
+          </a:p>
+          <a:p>
+            <a:r>
+              <a:rPr lang="en-US" sz="2400" dirty="0"/>
+              <a:t>Data is encoded within electromagnetic waves and </a:t>
+            </a:r>
+            <a:r>
+              <a:rPr lang="en-US" sz="2400" b="1" dirty="0"/>
+              <a:t>transmitted over long distances</a:t>
+            </a:r>
+            <a:r>
+              <a:rPr lang="en-US" sz="2400" dirty="0"/>
+              <a:t>. </a:t>
+            </a:r>
+          </a:p>
+          <a:p>
+            <a:r>
+              <a:rPr lang="en-US" sz="2400" dirty="0"/>
+              <a:t>Two methods of steering is possible: </a:t>
+            </a:r>
+            <a:r>
+              <a:rPr lang="en-US" sz="2400" b="1" dirty="0"/>
+              <a:t>Mechanical </a:t>
+            </a:r>
+            <a:r>
+              <a:rPr lang="en-US" sz="2400" dirty="0"/>
+              <a:t>steering &amp; </a:t>
+            </a:r>
+            <a:r>
+              <a:rPr lang="en-US" sz="2400" b="1" dirty="0"/>
+              <a:t>Phased arrays</a:t>
+            </a:r>
+            <a:r>
+              <a:rPr lang="en-US" sz="2400" dirty="0"/>
+              <a:t>. </a:t>
             </a:r>
           </a:p>
         </p:txBody>
@@ -11390,8 +13196,8 @@
           </a:fontRef>
         </p:style>
       </p:cxnSp>
-      <mc:AlternateContent xmlns:mc="http://schemas.openxmlformats.org/markup-compatibility/2006">
-        <mc:Choice xmlns:a14="http://schemas.microsoft.com/office/drawing/2010/main" Requires="a14">
+      <mc:AlternateContent xmlns:mc="http://schemas.openxmlformats.org/markup-compatibility/2006" xmlns:a14="http://schemas.microsoft.com/office/drawing/2010/main">
+        <mc:Choice Requires="a14">
           <p:sp>
             <p:nvSpPr>
               <p:cNvPr id="12" name="TextBox 11">
@@ -11420,6 +13226,7 @@
               </a:bodyPr>
               <a:lstStyle/>
               <a:p>
+                <a:pPr/>
                 <a14:m>
                   <m:oMathPara xmlns:m="http://schemas.openxmlformats.org/officeDocument/2006/math">
                     <m:oMathParaPr>
@@ -11446,7 +13253,7 @@
             </p:txBody>
           </p:sp>
         </mc:Choice>
-        <mc:Fallback>
+        <mc:Fallback xmlns="">
           <p:sp>
             <p:nvSpPr>
               <p:cNvPr id="12" name="TextBox 11">
@@ -11491,8 +13298,8 @@
           </p:sp>
         </mc:Fallback>
       </mc:AlternateContent>
-      <mc:AlternateContent xmlns:mc="http://schemas.openxmlformats.org/markup-compatibility/2006">
-        <mc:Choice xmlns:a14="http://schemas.microsoft.com/office/drawing/2010/main" Requires="a14">
+      <mc:AlternateContent xmlns:mc="http://schemas.openxmlformats.org/markup-compatibility/2006" xmlns:a14="http://schemas.microsoft.com/office/drawing/2010/main">
+        <mc:Choice Requires="a14">
           <p:sp>
             <p:nvSpPr>
               <p:cNvPr id="13" name="TextBox 12">
@@ -11521,6 +13328,7 @@
               </a:bodyPr>
               <a:lstStyle/>
               <a:p>
+                <a:pPr/>
                 <a14:m>
                   <m:oMathPara xmlns:m="http://schemas.openxmlformats.org/officeDocument/2006/math">
                     <m:oMathParaPr>
@@ -11547,7 +13355,7 @@
             </p:txBody>
           </p:sp>
         </mc:Choice>
-        <mc:Fallback>
+        <mc:Fallback xmlns="">
           <p:sp>
             <p:nvSpPr>
               <p:cNvPr id="13" name="TextBox 12">
@@ -11710,7 +13518,7 @@
                 <p:ph idx="1"/>
                 <p:extLst>
                   <p:ext uri="{D42A27DB-BD31-4B8C-83A1-F6EECF244321}">
-                    <p14:modId xmlns:p14="http://schemas.microsoft.com/office/powerpoint/2010/main" val="3370450323"/>
+                    <p14:modId xmlns:p14="http://schemas.microsoft.com/office/powerpoint/2010/main" val="1701674780"/>
                   </p:ext>
                 </p:extLst>
               </p:nvPr>
@@ -11811,7 +13619,7 @@
                         <a:p>
                           <a:r>
                             <a:rPr lang="en-ZA" dirty="0"/>
-                            <a:t>SLL (dB)</a:t>
+                            <a:t>SLL / GLL (dB) </a:t>
                           </a:r>
                         </a:p>
                       </a:txBody>
@@ -12545,7 +14353,7 @@
                 <p:ph idx="1"/>
                 <p:extLst>
                   <p:ext uri="{D42A27DB-BD31-4B8C-83A1-F6EECF244321}">
-                    <p14:modId xmlns:p14="http://schemas.microsoft.com/office/powerpoint/2010/main" val="3370450323"/>
+                    <p14:modId xmlns:p14="http://schemas.microsoft.com/office/powerpoint/2010/main" val="1701674780"/>
                   </p:ext>
                 </p:extLst>
               </p:nvPr>
@@ -12615,7 +14423,7 @@
                         <a:p>
                           <a:r>
                             <a:rPr lang="en-ZA" dirty="0"/>
-                            <a:t>SLL (dB)</a:t>
+                            <a:t>SLL / GLL (dB) </a:t>
                           </a:r>
                         </a:p>
                       </a:txBody>
@@ -13008,7 +14816,7 @@
         </p:nvSpPr>
         <p:spPr>
           <a:xfrm>
-            <a:off x="1788112" y="5803832"/>
+            <a:off x="1876888" y="6080060"/>
             <a:ext cx="6853561" cy="369332"/>
           </a:xfrm>
           <a:prstGeom prst="rect">
@@ -13046,14 +14854,14 @@
               <p:nvPr>
                 <p:extLst>
                   <p:ext uri="{D42A27DB-BD31-4B8C-83A1-F6EECF244321}">
-                    <p14:modId xmlns:p14="http://schemas.microsoft.com/office/powerpoint/2010/main" val="2855681047"/>
+                    <p14:modId xmlns:p14="http://schemas.microsoft.com/office/powerpoint/2010/main" val="1482771114"/>
                   </p:ext>
                 </p:extLst>
               </p:nvPr>
             </p:nvGraphicFramePr>
             <p:xfrm>
               <a:off x="1876888" y="4433276"/>
-              <a:ext cx="8128000" cy="1285240"/>
+              <a:ext cx="8128000" cy="1559560"/>
             </p:xfrm>
             <a:graphic>
               <a:graphicData uri="http://schemas.openxmlformats.org/drawingml/2006/table">
@@ -13216,7 +15024,7 @@
                           </a:pPr>
                           <a:r>
                             <a:rPr lang="en-ZA" dirty="0"/>
-                            <a:t>This depends on the application. </a:t>
+                            <a:t>This depends on the specification of the application. </a:t>
                           </a:r>
                         </a:p>
                       </a:txBody>
@@ -13249,14 +15057,14 @@
               <p:nvPr>
                 <p:extLst>
                   <p:ext uri="{D42A27DB-BD31-4B8C-83A1-F6EECF244321}">
-                    <p14:modId xmlns:p14="http://schemas.microsoft.com/office/powerpoint/2010/main" val="2855681047"/>
+                    <p14:modId xmlns:p14="http://schemas.microsoft.com/office/powerpoint/2010/main" val="1482771114"/>
                   </p:ext>
                 </p:extLst>
               </p:nvPr>
             </p:nvGraphicFramePr>
             <p:xfrm>
               <a:off x="1876888" y="4433276"/>
-              <a:ext cx="8128000" cy="1285240"/>
+              <a:ext cx="8128000" cy="1559560"/>
             </p:xfrm>
             <a:graphic>
               <a:graphicData uri="http://schemas.openxmlformats.org/drawingml/2006/table">
@@ -13313,7 +15121,7 @@
                       </a:ext>
                     </a:extLst>
                   </a:tr>
-                  <a:tr h="914400">
+                  <a:tr h="1188720">
                     <a:tc>
                       <a:txBody>
                         <a:bodyPr/>
@@ -13326,7 +15134,7 @@
                         <a:blipFill>
                           <a:blip r:embed="rId3"/>
                           <a:stretch>
-                            <a:fillRect l="-150" t="-43709" r="-100449" b="-9934"/>
+                            <a:fillRect l="-150" t="-33673" r="-100449" b="-7653"/>
                           </a:stretch>
                         </a:blipFill>
                       </a:tcPr>
@@ -13343,7 +15151,7 @@
                         <a:blipFill>
                           <a:blip r:embed="rId3"/>
                           <a:stretch>
-                            <a:fillRect l="-100300" t="-43709" r="-600" b="-9934"/>
+                            <a:fillRect l="-100300" t="-33673" r="-600" b="-7653"/>
                           </a:stretch>
                         </a:blipFill>
                       </a:tcPr>
@@ -13395,6 +15203,148 @@
           </a:p>
         </p:txBody>
       </p:sp>
+      <p:pic>
+        <p:nvPicPr>
+          <p:cNvPr id="29" name="Picture 28">
+            <a:extLst>
+              <a:ext uri="{FF2B5EF4-FFF2-40B4-BE49-F238E27FC236}">
+                <a16:creationId xmlns:a16="http://schemas.microsoft.com/office/drawing/2014/main" id="{FE21C59E-0341-4C96-9211-C1C6F2B6279D}"/>
+              </a:ext>
+            </a:extLst>
+          </p:cNvPr>
+          <p:cNvPicPr>
+            <a:picLocks noChangeAspect="1"/>
+          </p:cNvPicPr>
+          <p:nvPr/>
+        </p:nvPicPr>
+        <p:blipFill>
+          <a:blip r:embed="rId4"/>
+          <a:stretch>
+            <a:fillRect/>
+          </a:stretch>
+        </p:blipFill>
+        <p:spPr>
+          <a:xfrm>
+            <a:off x="7759106" y="190275"/>
+            <a:ext cx="3594694" cy="436666"/>
+          </a:xfrm>
+          <a:prstGeom prst="rect">
+            <a:avLst/>
+          </a:prstGeom>
+        </p:spPr>
+      </p:pic>
+      <mc:AlternateContent xmlns:mc="http://schemas.openxmlformats.org/markup-compatibility/2006" xmlns:a14="http://schemas.microsoft.com/office/drawing/2010/main">
+        <mc:Choice Requires="a14">
+          <p:sp>
+            <p:nvSpPr>
+              <p:cNvPr id="30" name="TextBox 29">
+                <a:extLst>
+                  <a:ext uri="{FF2B5EF4-FFF2-40B4-BE49-F238E27FC236}">
+                    <a16:creationId xmlns:a16="http://schemas.microsoft.com/office/drawing/2014/main" id="{85D4DAAA-20DF-417A-A361-90B0556C00F1}"/>
+                  </a:ext>
+                </a:extLst>
+              </p:cNvPr>
+              <p:cNvSpPr txBox="1"/>
+              <p:nvPr/>
+            </p:nvSpPr>
+            <p:spPr>
+              <a:xfrm>
+                <a:off x="6720419" y="1696528"/>
+                <a:ext cx="3594693" cy="369332"/>
+              </a:xfrm>
+              <a:prstGeom prst="rect">
+                <a:avLst/>
+              </a:prstGeom>
+              <a:noFill/>
+            </p:spPr>
+            <p:txBody>
+              <a:bodyPr wrap="square" rtlCol="0">
+                <a:spAutoFit/>
+              </a:bodyPr>
+              <a:lstStyle/>
+              <a:p>
+                <a14:m>
+                  <m:oMath xmlns:m="http://schemas.openxmlformats.org/officeDocument/2006/math">
+                    <m:sSub>
+                      <m:sSubPr>
+                        <m:ctrlPr>
+                          <a:rPr lang="en-ZA" b="0" i="1" smtClean="0">
+                            <a:latin typeface="Cambria Math" panose="02040503050406030204" pitchFamily="18" charset="0"/>
+                          </a:rPr>
+                        </m:ctrlPr>
+                      </m:sSubPr>
+                      <m:e>
+                        <m:r>
+                          <a:rPr lang="en-ZA" b="0" i="1" smtClean="0">
+                            <a:latin typeface="Cambria Math" panose="02040503050406030204" pitchFamily="18" charset="0"/>
+                          </a:rPr>
+                          <m:t>𝑆</m:t>
+                        </m:r>
+                      </m:e>
+                      <m:sub>
+                        <m:r>
+                          <a:rPr lang="en-ZA" b="0" i="1" smtClean="0">
+                            <a:latin typeface="Cambria Math" panose="02040503050406030204" pitchFamily="18" charset="0"/>
+                          </a:rPr>
+                          <m:t>1</m:t>
+                        </m:r>
+                      </m:sub>
+                    </m:sSub>
+                  </m:oMath>
+                </a14:m>
+                <a:r>
+                  <a:rPr lang="en-ZA" dirty="0"/>
+                  <a:t>= [ 0.3, 0.475, 0.52, 0.475, 0.3]</a:t>
+                </a:r>
+              </a:p>
+            </p:txBody>
+          </p:sp>
+        </mc:Choice>
+        <mc:Fallback xmlns="">
+          <p:sp>
+            <p:nvSpPr>
+              <p:cNvPr id="30" name="TextBox 29">
+                <a:extLst>
+                  <a:ext uri="{FF2B5EF4-FFF2-40B4-BE49-F238E27FC236}">
+                    <a16:creationId xmlns:a16="http://schemas.microsoft.com/office/drawing/2014/main" id="{85D4DAAA-20DF-417A-A361-90B0556C00F1}"/>
+                  </a:ext>
+                </a:extLst>
+              </p:cNvPr>
+              <p:cNvSpPr txBox="1">
+                <a:spLocks noRot="1" noChangeAspect="1" noMove="1" noResize="1" noEditPoints="1" noAdjustHandles="1" noChangeArrowheads="1" noChangeShapeType="1" noTextEdit="1"/>
+              </p:cNvSpPr>
+              <p:nvPr/>
+            </p:nvSpPr>
+            <p:spPr>
+              <a:xfrm>
+                <a:off x="6720419" y="1696528"/>
+                <a:ext cx="3594693" cy="369332"/>
+              </a:xfrm>
+              <a:prstGeom prst="rect">
+                <a:avLst/>
+              </a:prstGeom>
+              <a:blipFill>
+                <a:blip r:embed="rId5"/>
+                <a:stretch>
+                  <a:fillRect t="-8197" b="-24590"/>
+                </a:stretch>
+              </a:blipFill>
+            </p:spPr>
+            <p:txBody>
+              <a:bodyPr/>
+              <a:lstStyle/>
+              <a:p>
+                <a:r>
+                  <a:rPr lang="en-ZA">
+                    <a:noFill/>
+                  </a:rPr>
+                  <a:t> </a:t>
+                </a:r>
+              </a:p>
+            </p:txBody>
+          </p:sp>
+        </mc:Fallback>
+      </mc:AlternateContent>
     </p:spTree>
     <p:extLst>
       <p:ext uri="{BB962C8B-B14F-4D97-AF65-F5344CB8AC3E}">
@@ -13473,29 +15423,96 @@
             </p:nvSpPr>
             <p:spPr/>
             <p:txBody>
-              <a:bodyPr/>
+              <a:bodyPr>
+                <a:normAutofit lnSpcReduction="10000"/>
+              </a:bodyPr>
               <a:lstStyle/>
               <a:p>
                 <a:r>
                   <a:rPr lang="en-ZA" dirty="0"/>
-                  <a:t>Grating lobes are as a result of the periodicity of the AF. Only the arrangement in the LAA affect GL. </a:t>
+                  <a:t>Grating lobes are as a result of the </a:t>
+                </a:r>
+                <a:r>
+                  <a:rPr lang="en-ZA" b="1" dirty="0"/>
+                  <a:t>periodicity</a:t>
+                </a:r>
+                <a:r>
+                  <a:rPr lang="en-ZA" dirty="0"/>
+                  <a:t> of the </a:t>
+                </a:r>
+                <a:r>
+                  <a:rPr lang="en-ZA" b="1" dirty="0"/>
+                  <a:t>AF</a:t>
+                </a:r>
+                <a:r>
+                  <a:rPr lang="en-ZA" dirty="0"/>
+                  <a:t>. </a:t>
                 </a:r>
               </a:p>
               <a:p>
                 <a:r>
                   <a:rPr lang="en-ZA" dirty="0"/>
-                  <a:t>The GA optimised the LAA for </a:t>
+                  <a:t>The only parameter that affects the GL is the </a:t>
+                </a:r>
+                <a:r>
+                  <a:rPr lang="en-ZA" b="1" dirty="0"/>
+                  <a:t>element spacing</a:t>
+                </a:r>
+                <a:r>
+                  <a:rPr lang="en-ZA" dirty="0"/>
+                  <a:t>. </a:t>
+                </a:r>
+              </a:p>
+              <a:p>
+                <a:r>
+                  <a:rPr lang="en-ZA" dirty="0"/>
+                  <a:t>The spacing is only optimised for </a:t>
                 </a:r>
                 <a14:m>
                   <m:oMath xmlns:m="http://schemas.openxmlformats.org/officeDocument/2006/math">
+                    <m:sSub>
+                      <m:sSubPr>
+                        <m:ctrlPr>
+                          <a:rPr lang="en-ZA" b="1" i="1" smtClean="0">
+                            <a:latin typeface="Cambria Math" panose="02040503050406030204" pitchFamily="18" charset="0"/>
+                            <a:ea typeface="Cambria Math" panose="02040503050406030204" pitchFamily="18" charset="0"/>
+                          </a:rPr>
+                        </m:ctrlPr>
+                      </m:sSubPr>
+                      <m:e>
+                        <m:r>
+                          <a:rPr lang="el-GR" b="1" i="1" smtClean="0">
+                            <a:latin typeface="Cambria Math" panose="02040503050406030204" pitchFamily="18" charset="0"/>
+                            <a:ea typeface="Cambria Math" panose="02040503050406030204" pitchFamily="18" charset="0"/>
+                          </a:rPr>
+                          <m:t>𝜽</m:t>
+                        </m:r>
+                      </m:e>
+                      <m:sub>
+                        <m:r>
+                          <a:rPr lang="en-ZA" b="1" i="1" smtClean="0">
+                            <a:latin typeface="Cambria Math" panose="02040503050406030204" pitchFamily="18" charset="0"/>
+                            <a:ea typeface="Cambria Math" panose="02040503050406030204" pitchFamily="18" charset="0"/>
+                          </a:rPr>
+                          <m:t>𝑻</m:t>
+                        </m:r>
+                      </m:sub>
+                    </m:sSub>
                     <m:r>
-                      <a:rPr lang="en-ZA" b="0" i="1" smtClean="0">
+                      <a:rPr lang="en-ZA" b="1" i="1" smtClean="0">
+                        <a:latin typeface="Cambria Math" panose="02040503050406030204" pitchFamily="18" charset="0"/>
+                        <a:ea typeface="Cambria Math" panose="02040503050406030204" pitchFamily="18" charset="0"/>
+                      </a:rPr>
+                      <m:t>=</m:t>
+                    </m:r>
+                    <m:r>
+                      <a:rPr lang="en-ZA" b="1" i="1" smtClean="0">
                         <a:latin typeface="Cambria Math" panose="02040503050406030204" pitchFamily="18" charset="0"/>
                       </a:rPr>
-                      <m:t>20</m:t>
+                      <m:t>𝟐𝟎</m:t>
                     </m:r>
                     <m:r>
-                      <a:rPr lang="en-ZA" b="0" i="1" smtClean="0">
+                      <a:rPr lang="en-ZA" b="1" i="1" smtClean="0">
                         <a:latin typeface="Cambria Math" panose="02040503050406030204" pitchFamily="18" charset="0"/>
                         <a:ea typeface="Cambria Math" panose="02040503050406030204" pitchFamily="18" charset="0"/>
                       </a:rPr>
@@ -13504,26 +15521,98 @@
                   </m:oMath>
                 </a14:m>
                 <a:r>
-                  <a:rPr lang="en-ZA" dirty="0"/>
+                  <a:rPr lang="en-ZA" b="1" dirty="0"/>
                   <a:t>.</a:t>
                 </a:r>
               </a:p>
               <a:p>
                 <a:r>
                   <a:rPr lang="en-ZA" dirty="0"/>
-                  <a:t>The averaging spacing must be smaller or equal to half a wavelength.</a:t>
+                  <a:t>The </a:t>
+                </a:r>
+                <a:r>
+                  <a:rPr lang="en-ZA" b="1" dirty="0"/>
+                  <a:t>averaging spacing </a:t>
+                </a:r>
+                <a:r>
+                  <a:rPr lang="en-ZA" dirty="0"/>
+                  <a:t>must be smaller or equal to half a wavelength.</a:t>
                 </a:r>
               </a:p>
               <a:p>
                 <a:r>
                   <a:rPr lang="en-ZA" dirty="0"/>
-                  <a:t>A narrower spacing has a larger HPBW but a lower SLL and visa versa.</a:t>
+                  <a:t>A </a:t>
+                </a:r>
+                <a:r>
+                  <a:rPr lang="en-ZA" b="1" dirty="0"/>
+                  <a:t>narrower</a:t>
+                </a:r>
+                <a:r>
+                  <a:rPr lang="en-ZA" dirty="0"/>
+                  <a:t> </a:t>
+                </a:r>
+                <a:r>
+                  <a:rPr lang="en-ZA" b="1" dirty="0"/>
+                  <a:t>spacing</a:t>
+                </a:r>
+                <a:r>
+                  <a:rPr lang="en-ZA" dirty="0"/>
+                  <a:t> has a </a:t>
+                </a:r>
+                <a:r>
+                  <a:rPr lang="en-ZA" b="1" dirty="0"/>
+                  <a:t>larger</a:t>
+                </a:r>
+                <a:r>
+                  <a:rPr lang="en-ZA" dirty="0"/>
+                  <a:t> </a:t>
+                </a:r>
+                <a:r>
+                  <a:rPr lang="en-ZA" b="1" dirty="0"/>
+                  <a:t>HPBW</a:t>
+                </a:r>
+                <a:r>
+                  <a:rPr lang="en-ZA" dirty="0"/>
+                  <a:t> but a </a:t>
+                </a:r>
+                <a:r>
+                  <a:rPr lang="en-ZA" b="1" dirty="0"/>
+                  <a:t>lower SLL </a:t>
+                </a:r>
+                <a:r>
+                  <a:rPr lang="en-ZA" dirty="0"/>
+                  <a:t>and visa versa.</a:t>
                 </a:r>
               </a:p>
               <a:p>
                 <a:r>
                   <a:rPr lang="en-ZA" dirty="0"/>
-                  <a:t>The amplitude distribution affects lowers the SLL and can increase the HPBW.</a:t>
+                  <a:t>The </a:t>
+                </a:r>
+                <a:r>
+                  <a:rPr lang="en-ZA" b="1" dirty="0"/>
+                  <a:t>amplitude distribution </a:t>
+                </a:r>
+                <a:r>
+                  <a:rPr lang="en-ZA" dirty="0"/>
+                  <a:t>affects the </a:t>
+                </a:r>
+                <a:r>
+                  <a:rPr lang="en-ZA" b="1" dirty="0"/>
+                  <a:t>SLL</a:t>
+                </a:r>
+                <a:r>
+                  <a:rPr lang="en-ZA" dirty="0"/>
+                  <a:t> and the </a:t>
+                </a:r>
+                <a:r>
+                  <a:rPr lang="en-ZA" b="1" dirty="0"/>
+                  <a:t>HPBW</a:t>
+                </a:r>
+                <a:r>
+                  <a:rPr lang="en-ZA" dirty="0"/>
+                  <a:t>.</a:t>
                 </a:r>
               </a:p>
               <a:p>
@@ -13532,7 +15621,7 @@
               <a:p>
                 <a:r>
                   <a:rPr lang="en-ZA" dirty="0"/>
-                  <a:t>The parameters depends on the specifications of the application.</a:t>
+                  <a:t>The parameters depend on the specifications of the application.</a:t>
                 </a:r>
               </a:p>
             </p:txBody>
@@ -13559,7 +15648,7 @@
               <a:blipFill>
                 <a:blip r:embed="rId2"/>
                 <a:stretch>
-                  <a:fillRect l="-1043" t="-2241" r="-1739" b="-3081"/>
+                  <a:fillRect l="-1043" t="-3081"/>
                 </a:stretch>
               </a:blipFill>
             </p:spPr>
@@ -15195,7 +17284,23 @@
           <a:p>
             <a:r>
               <a:rPr lang="en-ZA" sz="2800" dirty="0"/>
-              <a:t>This means the electromagnetic energy can be transmitted further and more effectively. </a:t>
+              <a:t>This means the electromagnetic energy can be transmitted </a:t>
+            </a:r>
+            <a:r>
+              <a:rPr lang="en-ZA" sz="2800" b="1" dirty="0"/>
+              <a:t>further </a:t>
+            </a:r>
+            <a:r>
+              <a:rPr lang="en-ZA" sz="2800" dirty="0"/>
+              <a:t>and more </a:t>
+            </a:r>
+            <a:r>
+              <a:rPr lang="en-ZA" sz="2800" b="1" dirty="0"/>
+              <a:t>effectively</a:t>
+            </a:r>
+            <a:r>
+              <a:rPr lang="en-ZA" sz="2800" dirty="0"/>
+              <a:t>. </a:t>
             </a:r>
           </a:p>
         </p:txBody>
@@ -16159,6 +18264,52 @@
           </a:p>
         </p:txBody>
       </p:sp>
+      <p:sp>
+        <p:nvSpPr>
+          <p:cNvPr id="24" name="Oval 23">
+            <a:extLst>
+              <a:ext uri="{FF2B5EF4-FFF2-40B4-BE49-F238E27FC236}">
+                <a16:creationId xmlns:a16="http://schemas.microsoft.com/office/drawing/2014/main" id="{9040025A-E839-49BE-83BC-22B18C981F9A}"/>
+              </a:ext>
+            </a:extLst>
+          </p:cNvPr>
+          <p:cNvSpPr/>
+          <p:nvPr/>
+        </p:nvSpPr>
+        <p:spPr>
+          <a:xfrm>
+            <a:off x="5039555" y="3478800"/>
+            <a:ext cx="195309" cy="204187"/>
+          </a:xfrm>
+          <a:prstGeom prst="ellipse">
+            <a:avLst/>
+          </a:prstGeom>
+        </p:spPr>
+        <p:style>
+          <a:lnRef idx="2">
+            <a:schemeClr val="accent6">
+              <a:shade val="50000"/>
+            </a:schemeClr>
+          </a:lnRef>
+          <a:fillRef idx="1">
+            <a:schemeClr val="accent6"/>
+          </a:fillRef>
+          <a:effectRef idx="0">
+            <a:schemeClr val="accent6"/>
+          </a:effectRef>
+          <a:fontRef idx="minor">
+            <a:schemeClr val="lt1"/>
+          </a:fontRef>
+        </p:style>
+        <p:txBody>
+          <a:bodyPr rtlCol="0" anchor="ctr"/>
+          <a:lstStyle/>
+          <a:p>
+            <a:pPr algn="ctr"/>
+            <a:endParaRPr lang="en-ZA"/>
+          </a:p>
+        </p:txBody>
+      </p:sp>
     </p:spTree>
     <p:extLst>
       <p:ext uri="{BB962C8B-B14F-4D97-AF65-F5344CB8AC3E}">
@@ -16243,7 +18394,7 @@
             </a:pPr>
             <a:r>
               <a:rPr lang="en-US" dirty="0"/>
-              <a:t>This project investigated how the </a:t>
+              <a:t>This project investigated how the: </a:t>
             </a:r>
           </a:p>
           <a:p>
@@ -16282,7 +18433,7 @@
             </a:pPr>
             <a:r>
               <a:rPr lang="en-US" dirty="0"/>
-              <a:t>In an antenna array affect </a:t>
+              <a:t>In an LAA affect </a:t>
             </a:r>
             <a:r>
               <a:rPr lang="en-US" b="1" dirty="0"/>
@@ -16298,7 +18449,15 @@
             </a:r>
             <a:r>
               <a:rPr lang="en-US" dirty="0"/>
-              <a:t> to suppress the grating lobes while beam steering.</a:t>
+              <a:t> to </a:t>
+            </a:r>
+            <a:r>
+              <a:rPr lang="en-US" b="1" dirty="0"/>
+              <a:t>suppress</a:t>
+            </a:r>
+            <a:r>
+              <a:rPr lang="en-US" dirty="0"/>
+              <a:t> the grating lobes.</a:t>
             </a:r>
             <a:endParaRPr lang="en-ZA" dirty="0"/>
           </a:p>
@@ -16415,7 +18574,7 @@
           <a:p>
             <a:r>
               <a:rPr lang="en-US" dirty="0"/>
-              <a:t>Relative to a uniform LAA of half a wavelength.</a:t>
+              <a:t>Performance is measured relative to a uniform LAA of half a wavelength.</a:t>
             </a:r>
           </a:p>
           <a:p>
@@ -16507,7 +18666,7 @@
             </p:nvSpPr>
             <p:spPr>
               <a:xfrm>
-                <a:off x="2984376" y="2736406"/>
+                <a:off x="951390" y="2749976"/>
                 <a:ext cx="6223247" cy="1385187"/>
               </a:xfrm>
               <a:prstGeom prst="rect">
@@ -16766,7 +18925,7 @@
             </p:nvSpPr>
             <p:spPr>
               <a:xfrm>
-                <a:off x="2984376" y="2736406"/>
+                <a:off x="951390" y="2749976"/>
                 <a:ext cx="6223247" cy="1385187"/>
               </a:xfrm>
               <a:prstGeom prst="rect">
@@ -17388,6 +19547,237 @@
           </a:p>
         </p:txBody>
       </p:sp>
+      <mc:AlternateContent xmlns:mc="http://schemas.openxmlformats.org/markup-compatibility/2006">
+        <mc:Choice xmlns:a14="http://schemas.microsoft.com/office/drawing/2010/main" Requires="a14">
+          <p:sp>
+            <p:nvSpPr>
+              <p:cNvPr id="6" name="TextBox 5">
+                <a:extLst>
+                  <a:ext uri="{FF2B5EF4-FFF2-40B4-BE49-F238E27FC236}">
+                    <a16:creationId xmlns:a16="http://schemas.microsoft.com/office/drawing/2014/main" id="{946C64D1-26DA-47DD-9670-D4729675801B}"/>
+                  </a:ext>
+                </a:extLst>
+              </p:cNvPr>
+              <p:cNvSpPr txBox="1"/>
+              <p:nvPr/>
+            </p:nvSpPr>
+            <p:spPr>
+              <a:xfrm>
+                <a:off x="7976111" y="3001454"/>
+                <a:ext cx="3795911" cy="891013"/>
+              </a:xfrm>
+              <a:prstGeom prst="rect">
+                <a:avLst/>
+              </a:prstGeom>
+              <a:noFill/>
+            </p:spPr>
+            <p:txBody>
+              <a:bodyPr wrap="none" lIns="0" tIns="0" rIns="0" bIns="0" rtlCol="0">
+                <a:spAutoFit/>
+              </a:bodyPr>
+              <a:lstStyle/>
+              <a:p>
+                <a:pPr/>
+                <a14:m>
+                  <m:oMathPara xmlns:m="http://schemas.openxmlformats.org/officeDocument/2006/math">
+                    <m:oMathParaPr>
+                      <m:jc m:val="centerGroup"/>
+                    </m:oMathParaPr>
+                    <m:oMath xmlns:m="http://schemas.openxmlformats.org/officeDocument/2006/math">
+                      <m:func>
+                        <m:funcPr>
+                          <m:ctrlPr>
+                            <a:rPr lang="en-ZA" sz="2800" b="0" i="1" smtClean="0">
+                              <a:latin typeface="Cambria Math" panose="02040503050406030204" pitchFamily="18" charset="0"/>
+                            </a:rPr>
+                          </m:ctrlPr>
+                        </m:funcPr>
+                        <m:fName>
+                          <m:r>
+                            <m:rPr>
+                              <m:sty m:val="p"/>
+                            </m:rPr>
+                            <a:rPr lang="en-ZA" sz="2800" b="0" i="0" smtClean="0">
+                              <a:latin typeface="Cambria Math" panose="02040503050406030204" pitchFamily="18" charset="0"/>
+                            </a:rPr>
+                            <m:t>cos</m:t>
+                          </m:r>
+                        </m:fName>
+                        <m:e>
+                          <m:r>
+                            <a:rPr lang="en-ZA" sz="2800" b="0" i="1" smtClean="0">
+                              <a:latin typeface="Cambria Math" panose="02040503050406030204" pitchFamily="18" charset="0"/>
+                              <a:ea typeface="Cambria Math" panose="02040503050406030204" pitchFamily="18" charset="0"/>
+                            </a:rPr>
+                            <m:t>𝜃</m:t>
+                          </m:r>
+                          <m:r>
+                            <a:rPr lang="en-ZA" sz="2800" b="0" i="1" smtClean="0">
+                              <a:latin typeface="Cambria Math" panose="02040503050406030204" pitchFamily="18" charset="0"/>
+                              <a:ea typeface="Cambria Math" panose="02040503050406030204" pitchFamily="18" charset="0"/>
+                            </a:rPr>
+                            <m:t> −</m:t>
+                          </m:r>
+                          <m:r>
+                            <a:rPr lang="en-ZA" sz="2800" b="0" i="1" smtClean="0">
+                              <a:latin typeface="Cambria Math" panose="02040503050406030204" pitchFamily="18" charset="0"/>
+                              <a:ea typeface="Cambria Math" panose="02040503050406030204" pitchFamily="18" charset="0"/>
+                            </a:rPr>
+                            <m:t>𝑐𝑜𝑠</m:t>
+                          </m:r>
+                          <m:sSub>
+                            <m:sSubPr>
+                              <m:ctrlPr>
+                                <a:rPr lang="en-ZA" sz="2800" b="0" i="1" smtClean="0">
+                                  <a:latin typeface="Cambria Math" panose="02040503050406030204" pitchFamily="18" charset="0"/>
+                                  <a:ea typeface="Cambria Math" panose="02040503050406030204" pitchFamily="18" charset="0"/>
+                                </a:rPr>
+                              </m:ctrlPr>
+                            </m:sSubPr>
+                            <m:e>
+                              <m:r>
+                                <a:rPr lang="en-ZA" sz="2800" b="0" i="1" smtClean="0">
+                                  <a:latin typeface="Cambria Math" panose="02040503050406030204" pitchFamily="18" charset="0"/>
+                                  <a:ea typeface="Cambria Math" panose="02040503050406030204" pitchFamily="18" charset="0"/>
+                                </a:rPr>
+                                <m:t>𝜃</m:t>
+                              </m:r>
+                            </m:e>
+                            <m:sub>
+                              <m:r>
+                                <a:rPr lang="en-ZA" sz="2800" b="0" i="1" smtClean="0">
+                                  <a:latin typeface="Cambria Math" panose="02040503050406030204" pitchFamily="18" charset="0"/>
+                                  <a:ea typeface="Cambria Math" panose="02040503050406030204" pitchFamily="18" charset="0"/>
+                                </a:rPr>
+                                <m:t>𝑇</m:t>
+                              </m:r>
+                            </m:sub>
+                          </m:sSub>
+                          <m:r>
+                            <a:rPr lang="en-ZA" sz="2800" b="0" i="1" smtClean="0">
+                              <a:latin typeface="Cambria Math" panose="02040503050406030204" pitchFamily="18" charset="0"/>
+                              <a:ea typeface="Cambria Math" panose="02040503050406030204" pitchFamily="18" charset="0"/>
+                            </a:rPr>
+                            <m:t>=</m:t>
+                          </m:r>
+                          <m:r>
+                            <a:rPr lang="en-ZA" sz="2800" b="0" i="1" smtClean="0">
+                              <a:latin typeface="Cambria Math" panose="02040503050406030204" pitchFamily="18" charset="0"/>
+                              <a:ea typeface="Cambria Math" panose="02040503050406030204" pitchFamily="18" charset="0"/>
+                            </a:rPr>
+                            <m:t>𝑞</m:t>
+                          </m:r>
+                          <m:f>
+                            <m:fPr>
+                              <m:ctrlPr>
+                                <a:rPr lang="en-ZA" sz="2800" b="0" i="1" smtClean="0">
+                                  <a:latin typeface="Cambria Math" panose="02040503050406030204" pitchFamily="18" charset="0"/>
+                                  <a:ea typeface="Cambria Math" panose="02040503050406030204" pitchFamily="18" charset="0"/>
+                                </a:rPr>
+                              </m:ctrlPr>
+                            </m:fPr>
+                            <m:num>
+                              <m:r>
+                                <a:rPr lang="en-ZA" sz="2800" i="1">
+                                  <a:latin typeface="Cambria Math" panose="02040503050406030204" pitchFamily="18" charset="0"/>
+                                  <a:ea typeface="Cambria Math" panose="02040503050406030204" pitchFamily="18" charset="0"/>
+                                </a:rPr>
+                                <m:t>𝜆</m:t>
+                              </m:r>
+                            </m:num>
+                            <m:den>
+                              <m:sSub>
+                                <m:sSubPr>
+                                  <m:ctrlPr>
+                                    <a:rPr lang="en-ZA" sz="2800" b="0" i="1" smtClean="0">
+                                      <a:latin typeface="Cambria Math" panose="02040503050406030204" pitchFamily="18" charset="0"/>
+                                      <a:ea typeface="Cambria Math" panose="02040503050406030204" pitchFamily="18" charset="0"/>
+                                    </a:rPr>
+                                  </m:ctrlPr>
+                                </m:sSubPr>
+                                <m:e>
+                                  <m:r>
+                                    <a:rPr lang="en-ZA" sz="2800" b="0" i="1" smtClean="0">
+                                      <a:latin typeface="Cambria Math" panose="02040503050406030204" pitchFamily="18" charset="0"/>
+                                      <a:ea typeface="Cambria Math" panose="02040503050406030204" pitchFamily="18" charset="0"/>
+                                    </a:rPr>
+                                    <m:t>𝑑</m:t>
+                                  </m:r>
+                                </m:e>
+                                <m:sub>
+                                  <m:r>
+                                    <a:rPr lang="en-ZA" sz="2800" b="0" i="1" smtClean="0">
+                                      <a:latin typeface="Cambria Math" panose="02040503050406030204" pitchFamily="18" charset="0"/>
+                                      <a:ea typeface="Cambria Math" panose="02040503050406030204" pitchFamily="18" charset="0"/>
+                                    </a:rPr>
+                                    <m:t>𝑚</m:t>
+                                  </m:r>
+                                </m:sub>
+                              </m:sSub>
+                            </m:den>
+                          </m:f>
+                          <m:r>
+                            <a:rPr lang="en-ZA" sz="2800" b="0" i="1" smtClean="0">
+                              <a:latin typeface="Cambria Math" panose="02040503050406030204" pitchFamily="18" charset="0"/>
+                              <a:ea typeface="Cambria Math" panose="02040503050406030204" pitchFamily="18" charset="0"/>
+                            </a:rPr>
+                            <m:t>    </m:t>
+                          </m:r>
+                        </m:e>
+                      </m:func>
+                    </m:oMath>
+                  </m:oMathPara>
+                </a14:m>
+                <a:endParaRPr lang="en-ZA" dirty="0"/>
+              </a:p>
+            </p:txBody>
+          </p:sp>
+        </mc:Choice>
+        <mc:Fallback>
+          <p:sp>
+            <p:nvSpPr>
+              <p:cNvPr id="6" name="TextBox 5">
+                <a:extLst>
+                  <a:ext uri="{FF2B5EF4-FFF2-40B4-BE49-F238E27FC236}">
+                    <a16:creationId xmlns:a16="http://schemas.microsoft.com/office/drawing/2014/main" id="{946C64D1-26DA-47DD-9670-D4729675801B}"/>
+                  </a:ext>
+                </a:extLst>
+              </p:cNvPr>
+              <p:cNvSpPr txBox="1">
+                <a:spLocks noRot="1" noChangeAspect="1" noMove="1" noResize="1" noEditPoints="1" noAdjustHandles="1" noChangeArrowheads="1" noChangeShapeType="1" noTextEdit="1"/>
+              </p:cNvSpPr>
+              <p:nvPr/>
+            </p:nvSpPr>
+            <p:spPr>
+              <a:xfrm>
+                <a:off x="7976111" y="3001454"/>
+                <a:ext cx="3795911" cy="891013"/>
+              </a:xfrm>
+              <a:prstGeom prst="rect">
+                <a:avLst/>
+              </a:prstGeom>
+              <a:blipFill>
+                <a:blip r:embed="rId6"/>
+                <a:stretch>
+                  <a:fillRect/>
+                </a:stretch>
+              </a:blipFill>
+            </p:spPr>
+            <p:txBody>
+              <a:bodyPr/>
+              <a:lstStyle/>
+              <a:p>
+                <a:r>
+                  <a:rPr lang="en-ZA">
+                    <a:noFill/>
+                  </a:rPr>
+                  <a:t> </a:t>
+                </a:r>
+              </a:p>
+            </p:txBody>
+          </p:sp>
+        </mc:Fallback>
+      </mc:AlternateContent>
     </p:spTree>
     <p:extLst>
       <p:ext uri="{BB962C8B-B14F-4D97-AF65-F5344CB8AC3E}">

</xml_diff>